<commit_message>
adding payoffs to models
updating pptx
</commit_message>
<xml_diff>
--- a/pptx/Chaperon_Based_Hiring_Model.pptx
+++ b/pptx/Chaperon_Based_Hiring_Model.pptx
@@ -15,9 +15,13 @@
     <p:sldId id="263" r:id="rId9"/>
     <p:sldId id="264" r:id="rId10"/>
     <p:sldId id="265" r:id="rId11"/>
-    <p:sldId id="266" r:id="rId12"/>
-    <p:sldId id="268" r:id="rId13"/>
-    <p:sldId id="269" r:id="rId14"/>
+    <p:sldId id="270" r:id="rId12"/>
+    <p:sldId id="267" r:id="rId13"/>
+    <p:sldId id="271" r:id="rId14"/>
+    <p:sldId id="272" r:id="rId15"/>
+    <p:sldId id="273" r:id="rId16"/>
+    <p:sldId id="268" r:id="rId17"/>
+    <p:sldId id="269" r:id="rId18"/>
   </p:sldIdLst>
   <p:sldSz cx="9144000" cy="6858000" type="screen4x3"/>
   <p:notesSz cx="6858000" cy="9144000"/>
@@ -314,7 +318,7 @@
           <a:p>
             <a:fld id="{5BCAD085-E8A6-8845-BD4E-CB4CCA059FC4}" type="datetimeFigureOut">
               <a:rPr lang="en-US" smtClean="0"/>
-              <a:t>1/20/26</a:t>
+              <a:t>1/21/26</a:t>
             </a:fld>
             <a:endParaRPr lang="en-US"/>
           </a:p>
@@ -482,7 +486,7 @@
           <a:p>
             <a:fld id="{5BCAD085-E8A6-8845-BD4E-CB4CCA059FC4}" type="datetimeFigureOut">
               <a:rPr lang="en-US" smtClean="0"/>
-              <a:t>1/20/26</a:t>
+              <a:t>1/21/26</a:t>
             </a:fld>
             <a:endParaRPr lang="en-US"/>
           </a:p>
@@ -660,7 +664,7 @@
           <a:p>
             <a:fld id="{5BCAD085-E8A6-8845-BD4E-CB4CCA059FC4}" type="datetimeFigureOut">
               <a:rPr lang="en-US" smtClean="0"/>
-              <a:t>1/20/26</a:t>
+              <a:t>1/21/26</a:t>
             </a:fld>
             <a:endParaRPr lang="en-US"/>
           </a:p>
@@ -828,7 +832,7 @@
           <a:p>
             <a:fld id="{5BCAD085-E8A6-8845-BD4E-CB4CCA059FC4}" type="datetimeFigureOut">
               <a:rPr lang="en-US" smtClean="0"/>
-              <a:t>1/20/26</a:t>
+              <a:t>1/21/26</a:t>
             </a:fld>
             <a:endParaRPr lang="en-US"/>
           </a:p>
@@ -1073,7 +1077,7 @@
           <a:p>
             <a:fld id="{5BCAD085-E8A6-8845-BD4E-CB4CCA059FC4}" type="datetimeFigureOut">
               <a:rPr lang="en-US" smtClean="0"/>
-              <a:t>1/20/26</a:t>
+              <a:t>1/21/26</a:t>
             </a:fld>
             <a:endParaRPr lang="en-US"/>
           </a:p>
@@ -1358,7 +1362,7 @@
           <a:p>
             <a:fld id="{5BCAD085-E8A6-8845-BD4E-CB4CCA059FC4}" type="datetimeFigureOut">
               <a:rPr lang="en-US" smtClean="0"/>
-              <a:t>1/20/26</a:t>
+              <a:t>1/21/26</a:t>
             </a:fld>
             <a:endParaRPr lang="en-US"/>
           </a:p>
@@ -1777,7 +1781,7 @@
           <a:p>
             <a:fld id="{5BCAD085-E8A6-8845-BD4E-CB4CCA059FC4}" type="datetimeFigureOut">
               <a:rPr lang="en-US" smtClean="0"/>
-              <a:t>1/20/26</a:t>
+              <a:t>1/21/26</a:t>
             </a:fld>
             <a:endParaRPr lang="en-US"/>
           </a:p>
@@ -1894,7 +1898,7 @@
           <a:p>
             <a:fld id="{5BCAD085-E8A6-8845-BD4E-CB4CCA059FC4}" type="datetimeFigureOut">
               <a:rPr lang="en-US" smtClean="0"/>
-              <a:t>1/20/26</a:t>
+              <a:t>1/21/26</a:t>
             </a:fld>
             <a:endParaRPr lang="en-US"/>
           </a:p>
@@ -1989,7 +1993,7 @@
           <a:p>
             <a:fld id="{5BCAD085-E8A6-8845-BD4E-CB4CCA059FC4}" type="datetimeFigureOut">
               <a:rPr lang="en-US" smtClean="0"/>
-              <a:t>1/20/26</a:t>
+              <a:t>1/21/26</a:t>
             </a:fld>
             <a:endParaRPr lang="en-US"/>
           </a:p>
@@ -2264,7 +2268,7 @@
           <a:p>
             <a:fld id="{5BCAD085-E8A6-8845-BD4E-CB4CCA059FC4}" type="datetimeFigureOut">
               <a:rPr lang="en-US" smtClean="0"/>
-              <a:t>1/20/26</a:t>
+              <a:t>1/21/26</a:t>
             </a:fld>
             <a:endParaRPr lang="en-US"/>
           </a:p>
@@ -2516,7 +2520,7 @@
           <a:p>
             <a:fld id="{5BCAD085-E8A6-8845-BD4E-CB4CCA059FC4}" type="datetimeFigureOut">
               <a:rPr lang="en-US" smtClean="0"/>
-              <a:t>1/20/26</a:t>
+              <a:t>1/21/26</a:t>
             </a:fld>
             <a:endParaRPr lang="en-US"/>
           </a:p>
@@ -2727,7 +2731,7 @@
           <a:p>
             <a:fld id="{5BCAD085-E8A6-8845-BD4E-CB4CCA059FC4}" type="datetimeFigureOut">
               <a:rPr lang="en-US" smtClean="0"/>
-              <a:t>1/20/26</a:t>
+              <a:t>1/21/26</a:t>
             </a:fld>
             <a:endParaRPr lang="en-US"/>
           </a:p>
@@ -3155,7 +3159,23 @@
             </a:pPr>
             <a:r>
               <a:rPr dirty="0"/>
-              <a:t>Using Network Effects and Publication Count</a:t>
+              <a:t>Using </a:t>
+            </a:r>
+            <a:r>
+              <a:rPr lang="en-US" b="1" dirty="0"/>
+              <a:t>Chaperon</a:t>
+            </a:r>
+            <a:r>
+              <a:rPr b="1" dirty="0"/>
+              <a:t> Effect</a:t>
+            </a:r>
+            <a:r>
+              <a:rPr dirty="0"/>
+              <a:t> and </a:t>
+            </a:r>
+            <a:r>
+              <a:rPr b="1" dirty="0"/>
+              <a:t>Publication Count</a:t>
             </a:r>
           </a:p>
           <a:p>
@@ -3386,7 +3406,7 @@
               <a:defRPr sz="4400"/>
             </a:pPr>
             <a:r>
-              <a:t>How to Use: Decision Rule</a:t>
+              <a:t>Beyond Probabilities: Payoffs</a:t>
             </a:r>
           </a:p>
         </p:txBody>
@@ -3408,13 +3428,12 @@
           <a:p>
             <a:r>
               <a:rPr dirty="0"/>
-              <a:t>Simple decision rule:</a:t>
-            </a:r>
-          </a:p>
-          <a:p>
-            <a:pPr marL="357188" indent="0">
-              <a:buNone/>
-              <a:defRPr sz="2400" b="1">
+              <a:t>Hiring decisions involve costs and benefits:</a:t>
+            </a:r>
+          </a:p>
+          <a:p>
+            <a:pPr>
+              <a:defRPr sz="1800">
                 <a:solidFill>
                   <a:srgbClr val="2ECC71"/>
                 </a:solidFill>
@@ -3422,31 +3441,12 @@
             </a:pPr>
             <a:r>
               <a:rPr dirty="0"/>
-              <a:t>IF </a:t>
-            </a:r>
-            <a:r>
-              <a:rPr dirty="0" err="1"/>
-              <a:t>Pr</a:t>
-            </a:r>
-            <a:r>
-              <a:rPr dirty="0"/>
-              <a:t>(F = good | G, N) &gt; 0.5</a:t>
-            </a:r>
-          </a:p>
-          <a:p>
-            <a:pPr marL="357188" indent="0">
-              <a:buNone/>
-              <a:defRPr sz="2800" b="1"/>
-            </a:pPr>
-            <a:r>
-              <a:rPr dirty="0"/>
-              <a:t>   → HIRE</a:t>
-            </a:r>
-          </a:p>
-          <a:p>
-            <a:pPr marL="357188" indent="0">
-              <a:buNone/>
-              <a:defRPr sz="2400" b="1">
+              <a:t>B = Payoff from hiring a GOOD candidate (e.g., 10)</a:t>
+            </a:r>
+          </a:p>
+          <a:p>
+            <a:pPr>
+              <a:defRPr sz="1800">
                 <a:solidFill>
                   <a:srgbClr val="E74C3C"/>
                 </a:solidFill>
@@ -3454,21 +3454,75 @@
             </a:pPr>
             <a:r>
               <a:rPr dirty="0"/>
-              <a:t>ELSE</a:t>
-            </a:r>
-          </a:p>
-          <a:p>
-            <a:pPr marL="357188" indent="0">
-              <a:buNone/>
-              <a:defRPr sz="2800" b="1"/>
-            </a:pPr>
-            <a:r>
-              <a:rPr dirty="0"/>
-              <a:t>   → REJECT</a:t>
-            </a:r>
-          </a:p>
-        </p:txBody>
-      </p:sp>
+              <a:t>b = Payoff from hiring a BAD candidate (e.g., </a:t>
+            </a:r>
+            <a:r>
+              <a:rPr lang="en-US" dirty="0"/>
+              <a:t>-</a:t>
+            </a:r>
+            <a:r>
+              <a:rPr dirty="0"/>
+              <a:t>2)</a:t>
+            </a:r>
+          </a:p>
+          <a:p>
+            <a:pPr>
+              <a:defRPr sz="1800">
+                <a:solidFill>
+                  <a:srgbClr val="3498DB"/>
+                </a:solidFill>
+              </a:defRPr>
+            </a:pPr>
+            <a:r>
+              <a:rPr dirty="0"/>
+              <a:t>w = Applicant payoff if hired (e.g., 5)</a:t>
+            </a:r>
+          </a:p>
+          <a:p>
+            <a:pPr>
+              <a:defRPr sz="2000" b="1">
+                <a:solidFill>
+                  <a:srgbClr val="003366"/>
+                </a:solidFill>
+              </a:defRPr>
+            </a:pPr>
+            <a:r>
+              <a:rPr dirty="0"/>
+              <a:t>Key insight: Not all mistakes cost the same!</a:t>
+            </a:r>
+          </a:p>
+        </p:txBody>
+      </p:sp>
+      <p:pic>
+        <p:nvPicPr>
+          <p:cNvPr id="5" name="Picture 4" descr="temp_payoffs.png">
+            <a:extLst>
+              <a:ext uri="{FF2B5EF4-FFF2-40B4-BE49-F238E27FC236}">
+                <a16:creationId xmlns:a16="http://schemas.microsoft.com/office/drawing/2014/main" id="{15DDAAB7-090D-EA6F-CFD2-E6BE5C5A97E9}"/>
+              </a:ext>
+            </a:extLst>
+          </p:cNvPr>
+          <p:cNvPicPr>
+            <a:picLocks noChangeAspect="1"/>
+          </p:cNvPicPr>
+          <p:nvPr/>
+        </p:nvPicPr>
+        <p:blipFill>
+          <a:blip r:embed="rId2"/>
+          <a:stretch>
+            <a:fillRect/>
+          </a:stretch>
+        </p:blipFill>
+        <p:spPr>
+          <a:xfrm>
+            <a:off x="457200" y="3886200"/>
+            <a:ext cx="8229600" cy="2743200"/>
+          </a:xfrm>
+          <a:prstGeom prst="rect">
+            <a:avLst/>
+          </a:prstGeom>
+        </p:spPr>
+      </p:pic>
     </p:spTree>
   </p:cSld>
   <p:clrMapOvr>
@@ -3513,7 +3567,7 @@
               <a:defRPr sz="4400"/>
             </a:pPr>
             <a:r>
-              <a:t>Summary</a:t>
+              <a:t>Expected Payoff Calculation</a:t>
             </a:r>
           </a:p>
         </p:txBody>
@@ -3530,84 +3584,110 @@
         </p:nvSpPr>
         <p:spPr/>
         <p:txBody>
-          <a:bodyPr/>
-          <a:lstStyle/>
-          <a:p>
-            <a:pPr marL="457200" indent="-457200">
-              <a:spcAft>
-                <a:spcPts val="1200"/>
-              </a:spcAft>
-              <a:buFont typeface="+mj-lt"/>
-              <a:buAutoNum type="arabicPeriod"/>
-              <a:defRPr sz="2200" b="1"/>
-            </a:pPr>
-            <a:r>
-              <a:rPr dirty="0"/>
-              <a:t>Start with prior belief about candidate quality</a:t>
-            </a:r>
-          </a:p>
-          <a:p>
-            <a:pPr marL="457200" indent="-457200">
-              <a:spcAft>
-                <a:spcPts val="1200"/>
-              </a:spcAft>
-              <a:buFont typeface="+mj-lt"/>
-              <a:buAutoNum type="arabicPeriod"/>
-              <a:defRPr sz="2200" b="1"/>
-            </a:pPr>
-            <a:r>
-              <a:rPr dirty="0"/>
-              <a:t>Observe signals: Network effect (G) and Papers (N)</a:t>
-            </a:r>
-          </a:p>
-          <a:p>
-            <a:pPr marL="457200" indent="-457200">
-              <a:spcAft>
-                <a:spcPts val="1200"/>
-              </a:spcAft>
-              <a:buFont typeface="+mj-lt"/>
-              <a:buAutoNum type="arabicPeriod"/>
-              <a:defRPr sz="2200" b="1"/>
-            </a:pPr>
-            <a:r>
-              <a:rPr dirty="0"/>
-              <a:t>Use Bayes' theorem to update beliefs</a:t>
-            </a:r>
-          </a:p>
-          <a:p>
-            <a:pPr marL="457200" indent="-457200">
-              <a:spcAft>
-                <a:spcPts val="1200"/>
-              </a:spcAft>
-              <a:buFont typeface="+mj-lt"/>
-              <a:buAutoNum type="arabicPeriod"/>
-              <a:defRPr sz="2200" b="1"/>
-            </a:pPr>
-            <a:r>
-              <a:rPr dirty="0"/>
-              <a:t>Get posterior probability: </a:t>
-            </a:r>
-            <a:r>
-              <a:rPr dirty="0" err="1"/>
+          <a:bodyPr>
+            <a:normAutofit/>
+          </a:bodyPr>
+          <a:lstStyle/>
+          <a:p>
+            <a:r>
+              <a:rPr sz="2400" dirty="0"/>
+              <a:t>Expected Payoff = Weighted average of possible outcomes:</a:t>
+            </a:r>
+            <a:endParaRPr lang="en-GB" sz="2400" dirty="0"/>
+          </a:p>
+          <a:p>
+            <a:pPr marL="457200" lvl="1" indent="0" algn="ctr">
+              <a:buNone/>
+              <a:defRPr sz="2200" b="1">
+                <a:solidFill>
+                  <a:srgbClr val="003366"/>
+                </a:solidFill>
+              </a:defRPr>
+            </a:pPr>
+            <a:r>
+              <a:rPr lang="en-GB" sz="2400" dirty="0"/>
+              <a:t>E[Payoff] = B × </a:t>
+            </a:r>
+            <a:r>
+              <a:rPr lang="en-GB" sz="2400" dirty="0" err="1"/>
               <a:t>Pr</a:t>
             </a:r>
             <a:r>
-              <a:rPr dirty="0"/>
-              <a:t>(F = good | G, N)</a:t>
-            </a:r>
-          </a:p>
-          <a:p>
-            <a:pPr marL="457200" indent="-457200">
-              <a:spcAft>
-                <a:spcPts val="1200"/>
-              </a:spcAft>
-              <a:buFont typeface="+mj-lt"/>
-              <a:buAutoNum type="arabicPeriod"/>
-              <a:defRPr sz="2200" b="1"/>
-            </a:pPr>
-            <a:r>
-              <a:rPr dirty="0"/>
-              <a:t>Make hiring decision based on probability</a:t>
+              <a:rPr lang="en-GB" sz="2400" dirty="0"/>
+              <a:t>(Good) + b × </a:t>
+            </a:r>
+            <a:r>
+              <a:rPr lang="en-GB" sz="2400" dirty="0" err="1"/>
+              <a:t>Pr</a:t>
+            </a:r>
+            <a:r>
+              <a:rPr lang="en-GB" sz="2400" dirty="0"/>
+              <a:t>(Bad)</a:t>
+            </a:r>
+          </a:p>
+          <a:p>
+            <a:pPr>
+              <a:defRPr sz="1800"/>
+            </a:pPr>
+            <a:r>
+              <a:rPr sz="2400" dirty="0"/>
+              <a:t>Or equivalently:</a:t>
+            </a:r>
+          </a:p>
+          <a:p>
+            <a:pPr marL="0" indent="0" algn="ctr">
+              <a:buNone/>
+              <a:defRPr sz="2000" b="1"/>
+            </a:pPr>
+            <a:r>
+              <a:rPr sz="2400" dirty="0"/>
+              <a:t>E[Payoff] = b + (B - b) × </a:t>
+            </a:r>
+            <a:r>
+              <a:rPr sz="2400" dirty="0" err="1"/>
+              <a:t>Pr</a:t>
+            </a:r>
+            <a:r>
+              <a:rPr sz="2400" dirty="0"/>
+              <a:t>(Good)</a:t>
+            </a:r>
+          </a:p>
+          <a:p>
+            <a:pPr>
+              <a:defRPr sz="1800"/>
+            </a:pPr>
+            <a:r>
+              <a:rPr sz="2400" dirty="0"/>
+              <a:t>Example: </a:t>
+            </a:r>
+            <a:br>
+              <a:rPr lang="en-US" sz="2400" dirty="0"/>
+            </a:br>
+            <a:r>
+              <a:rPr sz="2400" dirty="0"/>
+              <a:t>If </a:t>
+            </a:r>
+            <a:r>
+              <a:rPr sz="2400" dirty="0" err="1"/>
+              <a:t>Pr</a:t>
+            </a:r>
+            <a:r>
+              <a:rPr sz="2400" dirty="0"/>
+              <a:t>(Good) = 0.6, B = 10, b = 2</a:t>
+            </a:r>
+            <a:endParaRPr lang="en-GB" sz="2400" dirty="0"/>
+          </a:p>
+          <a:p>
+            <a:pPr marL="801688" indent="-334963">
+              <a:defRPr sz="1800" b="1">
+                <a:solidFill>
+                  <a:srgbClr val="2ECC71"/>
+                </a:solidFill>
+              </a:defRPr>
+            </a:pPr>
+            <a:r>
+              <a:rPr lang="en-GB" sz="2400" dirty="0"/>
+              <a:t>E[Payoff] = 2 + (10 - 2) × 0.6 = 6.8</a:t>
             </a:r>
           </a:p>
         </p:txBody>
@@ -3621,6 +3701,652 @@
 </file>
 
 <file path=ppt/slides/slide13.xml><?xml version="1.0" encoding="utf-8"?>
+<p:sld xmlns:a="http://schemas.openxmlformats.org/drawingml/2006/main" xmlns:r="http://schemas.openxmlformats.org/officeDocument/2006/relationships" xmlns:p="http://schemas.openxmlformats.org/presentationml/2006/main">
+  <p:cSld>
+    <p:spTree>
+      <p:nvGrpSpPr>
+        <p:cNvPr id="1" name=""/>
+        <p:cNvGrpSpPr/>
+        <p:nvPr/>
+      </p:nvGrpSpPr>
+      <p:grpSpPr>
+        <a:xfrm>
+          <a:off x="0" y="0"/>
+          <a:ext cx="0" cy="0"/>
+          <a:chOff x="0" y="0"/>
+          <a:chExt cx="0" cy="0"/>
+        </a:xfrm>
+      </p:grpSpPr>
+      <p:sp>
+        <p:nvSpPr>
+          <p:cNvPr id="2" name="Title 1"/>
+          <p:cNvSpPr>
+            <a:spLocks noGrp="1"/>
+          </p:cNvSpPr>
+          <p:nvPr>
+            <p:ph type="title"/>
+          </p:nvPr>
+        </p:nvSpPr>
+        <p:spPr/>
+        <p:txBody>
+          <a:bodyPr/>
+          <a:lstStyle/>
+          <a:p>
+            <a:pPr>
+              <a:defRPr sz="4400"/>
+            </a:pPr>
+            <a:r>
+              <a:t>Expected Payoff: Real Examples</a:t>
+            </a:r>
+          </a:p>
+        </p:txBody>
+      </p:sp>
+      <p:pic>
+        <p:nvPicPr>
+          <p:cNvPr id="5" name="Picture 4" descr="temp_expected_payoff.png">
+            <a:extLst>
+              <a:ext uri="{FF2B5EF4-FFF2-40B4-BE49-F238E27FC236}">
+                <a16:creationId xmlns:a16="http://schemas.microsoft.com/office/drawing/2014/main" id="{1B7B3838-F83C-A0B6-D579-01D7D37E4249}"/>
+              </a:ext>
+            </a:extLst>
+          </p:cNvPr>
+          <p:cNvPicPr>
+            <a:picLocks noChangeAspect="1"/>
+          </p:cNvPicPr>
+          <p:nvPr/>
+        </p:nvPicPr>
+        <p:blipFill>
+          <a:blip r:embed="rId2"/>
+          <a:stretch>
+            <a:fillRect/>
+          </a:stretch>
+        </p:blipFill>
+        <p:spPr>
+          <a:xfrm>
+            <a:off x="457200" y="1632858"/>
+            <a:ext cx="8229600" cy="4572000"/>
+          </a:xfrm>
+          <a:prstGeom prst="rect">
+            <a:avLst/>
+          </a:prstGeom>
+        </p:spPr>
+      </p:pic>
+    </p:spTree>
+  </p:cSld>
+  <p:clrMapOvr>
+    <a:masterClrMapping/>
+  </p:clrMapOvr>
+</p:sld>
+</file>
+
+<file path=ppt/slides/slide14.xml><?xml version="1.0" encoding="utf-8"?>
+<p:sld xmlns:a="http://schemas.openxmlformats.org/drawingml/2006/main" xmlns:r="http://schemas.openxmlformats.org/officeDocument/2006/relationships" xmlns:p="http://schemas.openxmlformats.org/presentationml/2006/main">
+  <p:cSld>
+    <p:spTree>
+      <p:nvGrpSpPr>
+        <p:cNvPr id="1" name=""/>
+        <p:cNvGrpSpPr/>
+        <p:nvPr/>
+      </p:nvGrpSpPr>
+      <p:grpSpPr>
+        <a:xfrm>
+          <a:off x="0" y="0"/>
+          <a:ext cx="0" cy="0"/>
+          <a:chOff x="0" y="0"/>
+          <a:chExt cx="0" cy="0"/>
+        </a:xfrm>
+      </p:grpSpPr>
+      <p:sp>
+        <p:nvSpPr>
+          <p:cNvPr id="2" name="Title 1"/>
+          <p:cNvSpPr>
+            <a:spLocks noGrp="1"/>
+          </p:cNvSpPr>
+          <p:nvPr>
+            <p:ph type="title"/>
+          </p:nvPr>
+        </p:nvSpPr>
+        <p:spPr/>
+        <p:txBody>
+          <a:bodyPr/>
+          <a:lstStyle/>
+          <a:p>
+            <a:pPr>
+              <a:defRPr sz="4400"/>
+            </a:pPr>
+            <a:r>
+              <a:t>Two Decision Approaches</a:t>
+            </a:r>
+          </a:p>
+        </p:txBody>
+      </p:sp>
+      <p:sp>
+        <p:nvSpPr>
+          <p:cNvPr id="3" name="Content Placeholder 2"/>
+          <p:cNvSpPr>
+            <a:spLocks noGrp="1"/>
+          </p:cNvSpPr>
+          <p:nvPr>
+            <p:ph idx="1"/>
+          </p:nvPr>
+        </p:nvSpPr>
+        <p:spPr/>
+        <p:txBody>
+          <a:bodyPr/>
+          <a:lstStyle/>
+          <a:p>
+            <a:r>
+              <a:rPr b="1" dirty="0"/>
+              <a:t>Approach 1: Probability-Based</a:t>
+            </a:r>
+          </a:p>
+          <a:p>
+            <a:pPr marL="933450" indent="-336550">
+              <a:defRPr sz="2000" b="1">
+                <a:solidFill>
+                  <a:srgbClr val="2ECC71"/>
+                </a:solidFill>
+              </a:defRPr>
+            </a:pPr>
+            <a:r>
+              <a:rPr dirty="0"/>
+              <a:t>IF </a:t>
+            </a:r>
+            <a:r>
+              <a:rPr dirty="0" err="1"/>
+              <a:t>Pr</a:t>
+            </a:r>
+            <a:r>
+              <a:rPr dirty="0"/>
+              <a:t>(F = good | G, N) &gt; 0.5 → HIRE</a:t>
+            </a:r>
+          </a:p>
+          <a:p>
+            <a:pPr marL="933450" indent="-336550">
+              <a:defRPr sz="2000" b="1">
+                <a:solidFill>
+                  <a:srgbClr val="E74C3C"/>
+                </a:solidFill>
+              </a:defRPr>
+            </a:pPr>
+            <a:r>
+              <a:rPr dirty="0"/>
+              <a:t>ELSE → REJECT</a:t>
+            </a:r>
+          </a:p>
+          <a:p>
+            <a:pPr marL="933450" indent="-336550">
+              <a:defRPr sz="1800"/>
+            </a:pPr>
+            <a:r>
+              <a:rPr dirty="0"/>
+              <a:t>✓ Simple and intuitive</a:t>
+            </a:r>
+          </a:p>
+          <a:p>
+            <a:pPr marL="933450" indent="-336550">
+              <a:defRPr sz="1800"/>
+            </a:pPr>
+            <a:r>
+              <a:rPr dirty="0"/>
+              <a:t>✗ Assumes symmetric costs</a:t>
+            </a:r>
+            <a:endParaRPr lang="en-US" dirty="0"/>
+          </a:p>
+          <a:p>
+            <a:pPr marL="596900" indent="0">
+              <a:buNone/>
+              <a:defRPr sz="1800"/>
+            </a:pPr>
+            <a:endParaRPr dirty="0"/>
+          </a:p>
+          <a:p>
+            <a:pPr>
+              <a:defRPr sz="2000" b="1">
+                <a:solidFill>
+                  <a:srgbClr val="003366"/>
+                </a:solidFill>
+              </a:defRPr>
+            </a:pPr>
+            <a:r>
+              <a:rPr sz="2800" dirty="0"/>
+              <a:t>Approach 2: Payoff-Based</a:t>
+            </a:r>
+          </a:p>
+          <a:p>
+            <a:pPr marL="987425" indent="-401638">
+              <a:defRPr sz="2000" b="1">
+                <a:solidFill>
+                  <a:srgbClr val="2ECC71"/>
+                </a:solidFill>
+              </a:defRPr>
+            </a:pPr>
+            <a:r>
+              <a:rPr dirty="0"/>
+              <a:t>IF E[Payoff] &gt; 0 → HIRE</a:t>
+            </a:r>
+          </a:p>
+          <a:p>
+            <a:pPr marL="987425" indent="-401638">
+              <a:defRPr sz="2000" b="1">
+                <a:solidFill>
+                  <a:srgbClr val="E74C3C"/>
+                </a:solidFill>
+              </a:defRPr>
+            </a:pPr>
+            <a:r>
+              <a:rPr dirty="0"/>
+              <a:t>ELSE → REJECT</a:t>
+            </a:r>
+          </a:p>
+          <a:p>
+            <a:pPr marL="987425" indent="-401638">
+              <a:defRPr sz="1800"/>
+            </a:pPr>
+            <a:r>
+              <a:rPr dirty="0"/>
+              <a:t>✓ Accounts for different costs/benefits</a:t>
+            </a:r>
+          </a:p>
+          <a:p>
+            <a:pPr marL="987425" indent="-401638">
+              <a:defRPr sz="1800"/>
+            </a:pPr>
+            <a:r>
+              <a:rPr dirty="0"/>
+              <a:t>✓ More realistic for actual decisions</a:t>
+            </a:r>
+          </a:p>
+        </p:txBody>
+      </p:sp>
+    </p:spTree>
+  </p:cSld>
+  <p:clrMapOvr>
+    <a:masterClrMapping/>
+  </p:clrMapOvr>
+</p:sld>
+</file>
+
+<file path=ppt/slides/slide15.xml><?xml version="1.0" encoding="utf-8"?>
+<p:sld xmlns:a="http://schemas.openxmlformats.org/drawingml/2006/main" xmlns:r="http://schemas.openxmlformats.org/officeDocument/2006/relationships" xmlns:p="http://schemas.openxmlformats.org/presentationml/2006/main">
+  <p:cSld>
+    <p:spTree>
+      <p:nvGrpSpPr>
+        <p:cNvPr id="1" name=""/>
+        <p:cNvGrpSpPr/>
+        <p:nvPr/>
+      </p:nvGrpSpPr>
+      <p:grpSpPr>
+        <a:xfrm>
+          <a:off x="0" y="0"/>
+          <a:ext cx="0" cy="0"/>
+          <a:chOff x="0" y="0"/>
+          <a:chExt cx="0" cy="0"/>
+        </a:xfrm>
+      </p:grpSpPr>
+      <p:sp>
+        <p:nvSpPr>
+          <p:cNvPr id="2" name="Title 1"/>
+          <p:cNvSpPr>
+            <a:spLocks noGrp="1"/>
+          </p:cNvSpPr>
+          <p:nvPr>
+            <p:ph type="title"/>
+          </p:nvPr>
+        </p:nvSpPr>
+        <p:spPr/>
+        <p:txBody>
+          <a:bodyPr/>
+          <a:lstStyle/>
+          <a:p>
+            <a:pPr>
+              <a:defRPr sz="4400"/>
+            </a:pPr>
+            <a:r>
+              <a:t>When Do Decisions Differ?</a:t>
+            </a:r>
+          </a:p>
+        </p:txBody>
+      </p:sp>
+      <p:sp>
+        <p:nvSpPr>
+          <p:cNvPr id="3" name="Content Placeholder 2"/>
+          <p:cNvSpPr>
+            <a:spLocks noGrp="1"/>
+          </p:cNvSpPr>
+          <p:nvPr>
+            <p:ph idx="1"/>
+          </p:nvPr>
+        </p:nvSpPr>
+        <p:spPr/>
+        <p:txBody>
+          <a:bodyPr>
+            <a:noAutofit/>
+          </a:bodyPr>
+          <a:lstStyle/>
+          <a:p>
+            <a:r>
+              <a:rPr sz="2800" dirty="0"/>
+              <a:t>Example: Candidate with </a:t>
+            </a:r>
+            <a:r>
+              <a:rPr sz="2800" dirty="0" err="1"/>
+              <a:t>Pr</a:t>
+            </a:r>
+            <a:r>
+              <a:rPr sz="2800" dirty="0"/>
+              <a:t>(Good) = 0.55</a:t>
+            </a:r>
+          </a:p>
+          <a:p>
+            <a:pPr lvl="1">
+              <a:defRPr sz="1800">
+                <a:solidFill>
+                  <a:srgbClr val="2ECC71"/>
+                </a:solidFill>
+              </a:defRPr>
+            </a:pPr>
+            <a:r>
+              <a:rPr sz="2000" dirty="0"/>
+              <a:t>Probability-based: HIRE (55% &gt; 50%)</a:t>
+            </a:r>
+          </a:p>
+          <a:p>
+            <a:pPr lvl="1"/>
+            <a:endParaRPr sz="2000" dirty="0"/>
+          </a:p>
+          <a:p>
+            <a:pPr lvl="1">
+              <a:defRPr sz="1800"/>
+            </a:pPr>
+            <a:r>
+              <a:rPr sz="2000" dirty="0"/>
+              <a:t>Payoff-based (B=10, b=2):</a:t>
+            </a:r>
+          </a:p>
+          <a:p>
+            <a:pPr lvl="1">
+              <a:defRPr sz="1800" b="1"/>
+            </a:pPr>
+            <a:r>
+              <a:rPr sz="2000" dirty="0"/>
+              <a:t>E[Payoff] = 2 + 8 × 0.55 = 6.4 &gt; 0 → HIRE</a:t>
+            </a:r>
+          </a:p>
+          <a:p>
+            <a:pPr lvl="1"/>
+            <a:endParaRPr sz="2000" dirty="0"/>
+          </a:p>
+          <a:p>
+            <a:pPr lvl="1">
+              <a:defRPr sz="1800"/>
+            </a:pPr>
+            <a:r>
+              <a:rPr sz="2000" dirty="0"/>
+              <a:t>Payoff-based (B=10, b=-10):</a:t>
+            </a:r>
+          </a:p>
+          <a:p>
+            <a:pPr lvl="1">
+              <a:defRPr sz="1800" b="1"/>
+            </a:pPr>
+            <a:r>
+              <a:rPr sz="2000" dirty="0"/>
+              <a:t>E[Payoff] = -10 + 20 × 0.55 = 1 &gt; 0 → HIRE</a:t>
+            </a:r>
+          </a:p>
+          <a:p>
+            <a:pPr lvl="1"/>
+            <a:endParaRPr sz="2000" dirty="0"/>
+          </a:p>
+          <a:p>
+            <a:pPr lvl="1">
+              <a:defRPr sz="1800"/>
+            </a:pPr>
+            <a:r>
+              <a:rPr sz="2000" dirty="0"/>
+              <a:t>Payoff-based (B=10, b=-30):</a:t>
+            </a:r>
+          </a:p>
+          <a:p>
+            <a:pPr lvl="1">
+              <a:defRPr sz="1800" b="1">
+                <a:solidFill>
+                  <a:srgbClr val="E74C3C"/>
+                </a:solidFill>
+              </a:defRPr>
+            </a:pPr>
+            <a:r>
+              <a:rPr sz="2000" dirty="0"/>
+              <a:t>E[Payoff] = -30 + 40 × 0.55 = -8 &lt; 0 → REJECT</a:t>
+            </a:r>
+          </a:p>
+          <a:p>
+            <a:pPr>
+              <a:defRPr sz="1800" b="1">
+                <a:solidFill>
+                  <a:srgbClr val="003366"/>
+                </a:solidFill>
+              </a:defRPr>
+            </a:pPr>
+            <a:endParaRPr lang="en-US" sz="2000" dirty="0"/>
+          </a:p>
+          <a:p>
+            <a:pPr>
+              <a:defRPr sz="1800" b="1">
+                <a:solidFill>
+                  <a:srgbClr val="003366"/>
+                </a:solidFill>
+              </a:defRPr>
+            </a:pPr>
+            <a:r>
+              <a:rPr sz="2000" dirty="0"/>
+              <a:t>Key insight: High cost of bad hires makes us more conservative!</a:t>
+            </a:r>
+          </a:p>
+        </p:txBody>
+      </p:sp>
+    </p:spTree>
+  </p:cSld>
+  <p:clrMapOvr>
+    <a:masterClrMapping/>
+  </p:clrMapOvr>
+</p:sld>
+</file>
+
+<file path=ppt/slides/slide16.xml><?xml version="1.0" encoding="utf-8"?>
+<p:sld xmlns:a="http://schemas.openxmlformats.org/drawingml/2006/main" xmlns:r="http://schemas.openxmlformats.org/officeDocument/2006/relationships" xmlns:p="http://schemas.openxmlformats.org/presentationml/2006/main">
+  <p:cSld>
+    <p:spTree>
+      <p:nvGrpSpPr>
+        <p:cNvPr id="1" name=""/>
+        <p:cNvGrpSpPr/>
+        <p:nvPr/>
+      </p:nvGrpSpPr>
+      <p:grpSpPr>
+        <a:xfrm>
+          <a:off x="0" y="0"/>
+          <a:ext cx="0" cy="0"/>
+          <a:chOff x="0" y="0"/>
+          <a:chExt cx="0" cy="0"/>
+        </a:xfrm>
+      </p:grpSpPr>
+      <p:sp>
+        <p:nvSpPr>
+          <p:cNvPr id="2" name="Title 1"/>
+          <p:cNvSpPr>
+            <a:spLocks noGrp="1"/>
+          </p:cNvSpPr>
+          <p:nvPr>
+            <p:ph type="title"/>
+          </p:nvPr>
+        </p:nvSpPr>
+        <p:spPr/>
+        <p:txBody>
+          <a:bodyPr/>
+          <a:lstStyle/>
+          <a:p>
+            <a:pPr>
+              <a:defRPr sz="4400"/>
+            </a:pPr>
+            <a:r>
+              <a:t>Summary</a:t>
+            </a:r>
+          </a:p>
+        </p:txBody>
+      </p:sp>
+      <p:sp>
+        <p:nvSpPr>
+          <p:cNvPr id="3" name="Content Placeholder 2"/>
+          <p:cNvSpPr>
+            <a:spLocks noGrp="1"/>
+          </p:cNvSpPr>
+          <p:nvPr>
+            <p:ph idx="1"/>
+          </p:nvPr>
+        </p:nvSpPr>
+        <p:spPr/>
+        <p:txBody>
+          <a:bodyPr/>
+          <a:lstStyle/>
+          <a:p>
+            <a:pPr marL="457200" indent="-457200">
+              <a:spcAft>
+                <a:spcPts val="1200"/>
+              </a:spcAft>
+              <a:buFont typeface="+mj-lt"/>
+              <a:buAutoNum type="arabicPeriod"/>
+              <a:defRPr sz="2200" b="1"/>
+            </a:pPr>
+            <a:r>
+              <a:rPr dirty="0"/>
+              <a:t>Start with prior belief about candidate quality</a:t>
+            </a:r>
+          </a:p>
+          <a:p>
+            <a:pPr marL="457200" indent="-457200">
+              <a:spcAft>
+                <a:spcPts val="1200"/>
+              </a:spcAft>
+              <a:buFont typeface="+mj-lt"/>
+              <a:buAutoNum type="arabicPeriod"/>
+              <a:defRPr sz="2200" b="1"/>
+            </a:pPr>
+            <a:r>
+              <a:rPr dirty="0"/>
+              <a:t>Observe signals: Network effect (G) and Papers (N)</a:t>
+            </a:r>
+          </a:p>
+          <a:p>
+            <a:pPr marL="457200" indent="-457200">
+              <a:spcAft>
+                <a:spcPts val="1200"/>
+              </a:spcAft>
+              <a:buFont typeface="+mj-lt"/>
+              <a:buAutoNum type="arabicPeriod"/>
+              <a:defRPr sz="2200" b="1"/>
+            </a:pPr>
+            <a:r>
+              <a:rPr dirty="0"/>
+              <a:t>Use Bayes' theorem to update beliefs</a:t>
+            </a:r>
+          </a:p>
+          <a:p>
+            <a:pPr marL="457200" indent="-457200">
+              <a:spcAft>
+                <a:spcPts val="1200"/>
+              </a:spcAft>
+              <a:buFont typeface="+mj-lt"/>
+              <a:buAutoNum type="arabicPeriod"/>
+              <a:defRPr sz="2200" b="1"/>
+            </a:pPr>
+            <a:r>
+              <a:rPr dirty="0"/>
+              <a:t>Get posterior probability: </a:t>
+            </a:r>
+            <a:r>
+              <a:rPr dirty="0" err="1"/>
+              <a:t>Pr</a:t>
+            </a:r>
+            <a:r>
+              <a:rPr dirty="0"/>
+              <a:t>(F = good | G, N)</a:t>
+            </a:r>
+          </a:p>
+          <a:p>
+            <a:pPr marL="457200" indent="-457200">
+              <a:spcAft>
+                <a:spcPts val="1200"/>
+              </a:spcAft>
+              <a:buFont typeface="+mj-lt"/>
+              <a:buAutoNum type="arabicPeriod"/>
+              <a:defRPr sz="2200" b="1"/>
+            </a:pPr>
+            <a:r>
+              <a:rPr lang="en-GB" dirty="0"/>
+              <a:t>Compute expected payoff: E[Payoff] = B × </a:t>
+            </a:r>
+            <a:r>
+              <a:rPr lang="en-GB" dirty="0" err="1"/>
+              <a:t>Pr</a:t>
+            </a:r>
+            <a:r>
+              <a:rPr lang="en-GB" dirty="0"/>
+              <a:t>(Good) + b × </a:t>
+            </a:r>
+            <a:r>
+              <a:rPr lang="en-GB" dirty="0" err="1"/>
+              <a:t>Pr</a:t>
+            </a:r>
+            <a:r>
+              <a:rPr lang="en-GB" dirty="0"/>
+              <a:t>(Bad)</a:t>
+            </a:r>
+          </a:p>
+          <a:p>
+            <a:pPr marL="457200" indent="-457200">
+              <a:spcAft>
+                <a:spcPts val="1200"/>
+              </a:spcAft>
+              <a:buFont typeface="+mj-lt"/>
+              <a:buAutoNum type="arabicPeriod"/>
+              <a:defRPr sz="2200" b="1"/>
+            </a:pPr>
+            <a:r>
+              <a:rPr dirty="0"/>
+              <a:t>Make hiring decision based on probability</a:t>
+            </a:r>
+            <a:r>
+              <a:rPr lang="en-US" dirty="0"/>
+              <a:t> </a:t>
+            </a:r>
+            <a:r>
+              <a:rPr lang="en-GB" dirty="0"/>
+              <a:t> (probability-based or payoff-based)</a:t>
+            </a:r>
+          </a:p>
+          <a:p>
+            <a:pPr marL="457200" indent="-457200">
+              <a:spcAft>
+                <a:spcPts val="1200"/>
+              </a:spcAft>
+              <a:buFont typeface="+mj-lt"/>
+              <a:buAutoNum type="arabicPeriod"/>
+              <a:defRPr sz="2200" b="1"/>
+            </a:pPr>
+            <a:endParaRPr dirty="0"/>
+          </a:p>
+        </p:txBody>
+      </p:sp>
+    </p:spTree>
+  </p:cSld>
+  <p:clrMapOvr>
+    <a:masterClrMapping/>
+  </p:clrMapOvr>
+</p:sld>
+</file>
+
+<file path=ppt/slides/slide17.xml><?xml version="1.0" encoding="utf-8"?>
 <p:sld xmlns:a="http://schemas.openxmlformats.org/drawingml/2006/main" xmlns:r="http://schemas.openxmlformats.org/officeDocument/2006/relationships" xmlns:p="http://schemas.openxmlformats.org/presentationml/2006/main">
   <p:cSld>
     <p:spTree>
@@ -4795,7 +5521,15 @@
             </a:pPr>
             <a:r>
               <a:rPr dirty="0"/>
-              <a:t>Rows: Network effect (Yes/No)</a:t>
+              <a:t>Rows: </a:t>
+            </a:r>
+            <a:r>
+              <a:rPr lang="en-US" dirty="0"/>
+              <a:t>Chaperon</a:t>
+            </a:r>
+            <a:r>
+              <a:rPr dirty="0"/>
+              <a:t> effect (Yes/No)</a:t>
             </a:r>
           </a:p>
           <a:p>

</xml_diff>

<commit_message>
updating slides (Bayes and interpretation of heatmap
</commit_message>
<xml_diff>
--- a/pptx/Chaperon_Based_Hiring_Model.pptx
+++ b/pptx/Chaperon_Based_Hiring_Model.pptx
@@ -13,15 +13,16 @@
     <p:sldId id="261" r:id="rId7"/>
     <p:sldId id="262" r:id="rId8"/>
     <p:sldId id="263" r:id="rId9"/>
-    <p:sldId id="264" r:id="rId10"/>
-    <p:sldId id="265" r:id="rId11"/>
-    <p:sldId id="270" r:id="rId12"/>
-    <p:sldId id="267" r:id="rId13"/>
-    <p:sldId id="271" r:id="rId14"/>
-    <p:sldId id="272" r:id="rId15"/>
-    <p:sldId id="273" r:id="rId16"/>
-    <p:sldId id="268" r:id="rId17"/>
-    <p:sldId id="269" r:id="rId18"/>
+    <p:sldId id="274" r:id="rId10"/>
+    <p:sldId id="264" r:id="rId11"/>
+    <p:sldId id="265" r:id="rId12"/>
+    <p:sldId id="270" r:id="rId13"/>
+    <p:sldId id="267" r:id="rId14"/>
+    <p:sldId id="271" r:id="rId15"/>
+    <p:sldId id="272" r:id="rId16"/>
+    <p:sldId id="273" r:id="rId17"/>
+    <p:sldId id="268" r:id="rId18"/>
+    <p:sldId id="269" r:id="rId19"/>
   </p:sldIdLst>
   <p:sldSz cx="9144000" cy="6858000" type="screen4x3"/>
   <p:notesSz cx="6858000" cy="9144000"/>
@@ -3118,7 +3119,9 @@
         </p:nvSpPr>
         <p:spPr/>
         <p:txBody>
-          <a:bodyPr/>
+          <a:bodyPr>
+            <a:noAutofit/>
+          </a:bodyPr>
           <a:lstStyle/>
           <a:p>
             <a:pPr>
@@ -3129,8 +3132,12 @@
               </a:defRPr>
             </a:pPr>
             <a:r>
-              <a:rPr dirty="0"/>
-              <a:t>Bayesian Hiring Model</a:t>
+              <a:rPr lang="en-US" sz="4600" dirty="0"/>
+              <a:t>Chaperon-Based</a:t>
+            </a:r>
+            <a:r>
+              <a:rPr sz="4600" dirty="0"/>
+              <a:t> Hiring Model</a:t>
             </a:r>
           </a:p>
         </p:txBody>
@@ -3189,11 +3196,17 @@
             </a:r>
             <a:r>
               <a:rPr dirty="0"/>
-              <a:t> Decisions</a:t>
+              <a:t> Decision</a:t>
             </a:r>
             <a:r>
               <a:rPr lang="en-US" dirty="0"/>
-              <a:t>: Hiring Use Case</a:t>
+              <a:t>s </a:t>
+            </a:r>
+          </a:p>
+          <a:p>
+            <a:r>
+              <a:rPr lang="en-US" dirty="0"/>
+              <a:t>in Hiring</a:t>
             </a:r>
             <a:endParaRPr dirty="0"/>
           </a:p>
@@ -3286,7 +3299,7 @@
               <a:defRPr sz="4400"/>
             </a:pPr>
             <a:r>
-              <a:t>Key Insights</a:t>
+              <a:t>Real Examples: Four Candidates</a:t>
             </a:r>
           </a:p>
         </p:txBody>
@@ -3306,62 +3319,34 @@
           <a:bodyPr/>
           <a:lstStyle/>
           <a:p>
-            <a:r>
-              <a:rPr dirty="0"/>
-              <a:t>Network effect is powerful:</a:t>
-            </a:r>
-            <a:endParaRPr lang="en-US" dirty="0"/>
-          </a:p>
-          <a:p>
-            <a:pPr lvl="1"/>
-            <a:r>
-              <a:rPr dirty="0"/>
-              <a:t>Candidates with network + few papers can still be good</a:t>
-            </a:r>
-            <a:endParaRPr lang="en-US" dirty="0"/>
-          </a:p>
-          <a:p>
-            <a:r>
-              <a:rPr dirty="0"/>
-              <a:t>Many papers help, but network matters more:</a:t>
-            </a:r>
-            <a:endParaRPr lang="en-US" dirty="0"/>
-          </a:p>
-          <a:p>
-            <a:pPr lvl="1"/>
-            <a:r>
-              <a:rPr dirty="0"/>
-              <a:t>No network + many papers = moderate probability</a:t>
-            </a:r>
-            <a:endParaRPr lang="en-US" dirty="0"/>
-          </a:p>
-          <a:p>
-            <a:r>
-              <a:rPr dirty="0">
-                <a:solidFill>
-                  <a:srgbClr val="FF0000"/>
-                </a:solidFill>
-              </a:rPr>
-              <a:t>Weakest signal: No network + few papers</a:t>
-            </a:r>
-            <a:endParaRPr lang="en-US" dirty="0">
-              <a:solidFill>
-                <a:srgbClr val="FF0000"/>
-              </a:solidFill>
-            </a:endParaRPr>
-          </a:p>
-          <a:p>
-            <a:r>
-              <a:rPr dirty="0">
-                <a:solidFill>
-                  <a:srgbClr val="00B050"/>
-                </a:solidFill>
-              </a:rPr>
-              <a:t>Strongest signal: Network + many papers</a:t>
-            </a:r>
-          </a:p>
-        </p:txBody>
-      </p:sp>
+            <a:endParaRPr/>
+          </a:p>
+        </p:txBody>
+      </p:sp>
+      <p:pic>
+        <p:nvPicPr>
+          <p:cNvPr id="4" name="Picture 3" descr="temp_examples.png"/>
+          <p:cNvPicPr>
+            <a:picLocks noChangeAspect="1"/>
+          </p:cNvPicPr>
+          <p:nvPr/>
+        </p:nvPicPr>
+        <p:blipFill>
+          <a:blip r:embed="rId2"/>
+          <a:stretch>
+            <a:fillRect/>
+          </a:stretch>
+        </p:blipFill>
+        <p:spPr>
+          <a:xfrm>
+            <a:off x="457200" y="1371600"/>
+            <a:ext cx="8229600" cy="5029200"/>
+          </a:xfrm>
+          <a:prstGeom prst="rect">
+            <a:avLst/>
+          </a:prstGeom>
+        </p:spPr>
+      </p:pic>
     </p:spTree>
   </p:cSld>
   <p:clrMapOvr>
@@ -3371,6 +3356,126 @@
 </file>
 
 <file path=ppt/slides/slide11.xml><?xml version="1.0" encoding="utf-8"?>
+<p:sld xmlns:a="http://schemas.openxmlformats.org/drawingml/2006/main" xmlns:r="http://schemas.openxmlformats.org/officeDocument/2006/relationships" xmlns:p="http://schemas.openxmlformats.org/presentationml/2006/main">
+  <p:cSld>
+    <p:spTree>
+      <p:nvGrpSpPr>
+        <p:cNvPr id="1" name=""/>
+        <p:cNvGrpSpPr/>
+        <p:nvPr/>
+      </p:nvGrpSpPr>
+      <p:grpSpPr>
+        <a:xfrm>
+          <a:off x="0" y="0"/>
+          <a:ext cx="0" cy="0"/>
+          <a:chOff x="0" y="0"/>
+          <a:chExt cx="0" cy="0"/>
+        </a:xfrm>
+      </p:grpSpPr>
+      <p:sp>
+        <p:nvSpPr>
+          <p:cNvPr id="2" name="Title 1"/>
+          <p:cNvSpPr>
+            <a:spLocks noGrp="1"/>
+          </p:cNvSpPr>
+          <p:nvPr>
+            <p:ph type="title"/>
+          </p:nvPr>
+        </p:nvSpPr>
+        <p:spPr/>
+        <p:txBody>
+          <a:bodyPr/>
+          <a:lstStyle/>
+          <a:p>
+            <a:pPr>
+              <a:defRPr sz="4400"/>
+            </a:pPr>
+            <a:r>
+              <a:t>Key Insights</a:t>
+            </a:r>
+          </a:p>
+        </p:txBody>
+      </p:sp>
+      <p:sp>
+        <p:nvSpPr>
+          <p:cNvPr id="3" name="Content Placeholder 2"/>
+          <p:cNvSpPr>
+            <a:spLocks noGrp="1"/>
+          </p:cNvSpPr>
+          <p:nvPr>
+            <p:ph idx="1"/>
+          </p:nvPr>
+        </p:nvSpPr>
+        <p:spPr/>
+        <p:txBody>
+          <a:bodyPr/>
+          <a:lstStyle/>
+          <a:p>
+            <a:r>
+              <a:rPr dirty="0"/>
+              <a:t>Network effect is powerful:</a:t>
+            </a:r>
+            <a:endParaRPr lang="en-US" dirty="0"/>
+          </a:p>
+          <a:p>
+            <a:pPr lvl="1"/>
+            <a:r>
+              <a:rPr dirty="0"/>
+              <a:t>Candidates with network + few papers can still be good</a:t>
+            </a:r>
+            <a:endParaRPr lang="en-US" dirty="0"/>
+          </a:p>
+          <a:p>
+            <a:r>
+              <a:rPr dirty="0"/>
+              <a:t>Many papers help, but network matters more:</a:t>
+            </a:r>
+            <a:endParaRPr lang="en-US" dirty="0"/>
+          </a:p>
+          <a:p>
+            <a:pPr lvl="1"/>
+            <a:r>
+              <a:rPr dirty="0"/>
+              <a:t>No network + many papers = moderate probability</a:t>
+            </a:r>
+            <a:endParaRPr lang="en-US" dirty="0"/>
+          </a:p>
+          <a:p>
+            <a:r>
+              <a:rPr dirty="0">
+                <a:solidFill>
+                  <a:srgbClr val="FF0000"/>
+                </a:solidFill>
+              </a:rPr>
+              <a:t>Weakest signal: No network + few papers</a:t>
+            </a:r>
+            <a:endParaRPr lang="en-US" dirty="0">
+              <a:solidFill>
+                <a:srgbClr val="FF0000"/>
+              </a:solidFill>
+            </a:endParaRPr>
+          </a:p>
+          <a:p>
+            <a:r>
+              <a:rPr dirty="0">
+                <a:solidFill>
+                  <a:srgbClr val="00B050"/>
+                </a:solidFill>
+              </a:rPr>
+              <a:t>Strongest signal: Network + many papers</a:t>
+            </a:r>
+          </a:p>
+        </p:txBody>
+      </p:sp>
+    </p:spTree>
+  </p:cSld>
+  <p:clrMapOvr>
+    <a:masterClrMapping/>
+  </p:clrMapOvr>
+</p:sld>
+</file>
+
+<file path=ppt/slides/slide12.xml><?xml version="1.0" encoding="utf-8"?>
 <p:sld xmlns:a="http://schemas.openxmlformats.org/drawingml/2006/main" xmlns:r="http://schemas.openxmlformats.org/officeDocument/2006/relationships" xmlns:p="http://schemas.openxmlformats.org/presentationml/2006/main">
   <p:cSld>
     <p:spTree>
@@ -3531,7 +3636,7 @@
 </p:sld>
 </file>
 
-<file path=ppt/slides/slide12.xml><?xml version="1.0" encoding="utf-8"?>
+<file path=ppt/slides/slide13.xml><?xml version="1.0" encoding="utf-8"?>
 <p:sld xmlns:a="http://schemas.openxmlformats.org/drawingml/2006/main" xmlns:r="http://schemas.openxmlformats.org/officeDocument/2006/relationships" xmlns:p="http://schemas.openxmlformats.org/presentationml/2006/main">
   <p:cSld>
     <p:spTree>
@@ -3700,7 +3805,7 @@
 </p:sld>
 </file>
 
-<file path=ppt/slides/slide13.xml><?xml version="1.0" encoding="utf-8"?>
+<file path=ppt/slides/slide14.xml><?xml version="1.0" encoding="utf-8"?>
 <p:sld xmlns:a="http://schemas.openxmlformats.org/drawingml/2006/main" xmlns:r="http://schemas.openxmlformats.org/officeDocument/2006/relationships" xmlns:p="http://schemas.openxmlformats.org/presentationml/2006/main">
   <p:cSld>
     <p:spTree>
@@ -3779,194 +3884,6 @@
 </p:sld>
 </file>
 
-<file path=ppt/slides/slide14.xml><?xml version="1.0" encoding="utf-8"?>
-<p:sld xmlns:a="http://schemas.openxmlformats.org/drawingml/2006/main" xmlns:r="http://schemas.openxmlformats.org/officeDocument/2006/relationships" xmlns:p="http://schemas.openxmlformats.org/presentationml/2006/main">
-  <p:cSld>
-    <p:spTree>
-      <p:nvGrpSpPr>
-        <p:cNvPr id="1" name=""/>
-        <p:cNvGrpSpPr/>
-        <p:nvPr/>
-      </p:nvGrpSpPr>
-      <p:grpSpPr>
-        <a:xfrm>
-          <a:off x="0" y="0"/>
-          <a:ext cx="0" cy="0"/>
-          <a:chOff x="0" y="0"/>
-          <a:chExt cx="0" cy="0"/>
-        </a:xfrm>
-      </p:grpSpPr>
-      <p:sp>
-        <p:nvSpPr>
-          <p:cNvPr id="2" name="Title 1"/>
-          <p:cNvSpPr>
-            <a:spLocks noGrp="1"/>
-          </p:cNvSpPr>
-          <p:nvPr>
-            <p:ph type="title"/>
-          </p:nvPr>
-        </p:nvSpPr>
-        <p:spPr/>
-        <p:txBody>
-          <a:bodyPr/>
-          <a:lstStyle/>
-          <a:p>
-            <a:pPr>
-              <a:defRPr sz="4400"/>
-            </a:pPr>
-            <a:r>
-              <a:t>Two Decision Approaches</a:t>
-            </a:r>
-          </a:p>
-        </p:txBody>
-      </p:sp>
-      <p:sp>
-        <p:nvSpPr>
-          <p:cNvPr id="3" name="Content Placeholder 2"/>
-          <p:cNvSpPr>
-            <a:spLocks noGrp="1"/>
-          </p:cNvSpPr>
-          <p:nvPr>
-            <p:ph idx="1"/>
-          </p:nvPr>
-        </p:nvSpPr>
-        <p:spPr/>
-        <p:txBody>
-          <a:bodyPr/>
-          <a:lstStyle/>
-          <a:p>
-            <a:r>
-              <a:rPr b="1" dirty="0"/>
-              <a:t>Approach 1: Probability-Based</a:t>
-            </a:r>
-          </a:p>
-          <a:p>
-            <a:pPr marL="933450" indent="-336550">
-              <a:defRPr sz="2000" b="1">
-                <a:solidFill>
-                  <a:srgbClr val="2ECC71"/>
-                </a:solidFill>
-              </a:defRPr>
-            </a:pPr>
-            <a:r>
-              <a:rPr dirty="0"/>
-              <a:t>IF </a:t>
-            </a:r>
-            <a:r>
-              <a:rPr dirty="0" err="1"/>
-              <a:t>Pr</a:t>
-            </a:r>
-            <a:r>
-              <a:rPr dirty="0"/>
-              <a:t>(F = good | G, N) &gt; 0.5 → HIRE</a:t>
-            </a:r>
-          </a:p>
-          <a:p>
-            <a:pPr marL="933450" indent="-336550">
-              <a:defRPr sz="2000" b="1">
-                <a:solidFill>
-                  <a:srgbClr val="E74C3C"/>
-                </a:solidFill>
-              </a:defRPr>
-            </a:pPr>
-            <a:r>
-              <a:rPr dirty="0"/>
-              <a:t>ELSE → REJECT</a:t>
-            </a:r>
-          </a:p>
-          <a:p>
-            <a:pPr marL="933450" indent="-336550">
-              <a:defRPr sz="1800"/>
-            </a:pPr>
-            <a:r>
-              <a:rPr dirty="0"/>
-              <a:t>✓ Simple and intuitive</a:t>
-            </a:r>
-          </a:p>
-          <a:p>
-            <a:pPr marL="933450" indent="-336550">
-              <a:defRPr sz="1800"/>
-            </a:pPr>
-            <a:r>
-              <a:rPr dirty="0"/>
-              <a:t>✗ Assumes symmetric costs</a:t>
-            </a:r>
-            <a:endParaRPr lang="en-US" dirty="0"/>
-          </a:p>
-          <a:p>
-            <a:pPr marL="596900" indent="0">
-              <a:buNone/>
-              <a:defRPr sz="1800"/>
-            </a:pPr>
-            <a:endParaRPr dirty="0"/>
-          </a:p>
-          <a:p>
-            <a:pPr>
-              <a:defRPr sz="2000" b="1">
-                <a:solidFill>
-                  <a:srgbClr val="003366"/>
-                </a:solidFill>
-              </a:defRPr>
-            </a:pPr>
-            <a:r>
-              <a:rPr sz="2800" dirty="0"/>
-              <a:t>Approach 2: Payoff-Based</a:t>
-            </a:r>
-          </a:p>
-          <a:p>
-            <a:pPr marL="987425" indent="-401638">
-              <a:defRPr sz="2000" b="1">
-                <a:solidFill>
-                  <a:srgbClr val="2ECC71"/>
-                </a:solidFill>
-              </a:defRPr>
-            </a:pPr>
-            <a:r>
-              <a:rPr dirty="0"/>
-              <a:t>IF E[Payoff] &gt; 0 → HIRE</a:t>
-            </a:r>
-          </a:p>
-          <a:p>
-            <a:pPr marL="987425" indent="-401638">
-              <a:defRPr sz="2000" b="1">
-                <a:solidFill>
-                  <a:srgbClr val="E74C3C"/>
-                </a:solidFill>
-              </a:defRPr>
-            </a:pPr>
-            <a:r>
-              <a:rPr dirty="0"/>
-              <a:t>ELSE → REJECT</a:t>
-            </a:r>
-          </a:p>
-          <a:p>
-            <a:pPr marL="987425" indent="-401638">
-              <a:defRPr sz="1800"/>
-            </a:pPr>
-            <a:r>
-              <a:rPr dirty="0"/>
-              <a:t>✓ Accounts for different costs/benefits</a:t>
-            </a:r>
-          </a:p>
-          <a:p>
-            <a:pPr marL="987425" indent="-401638">
-              <a:defRPr sz="1800"/>
-            </a:pPr>
-            <a:r>
-              <a:rPr dirty="0"/>
-              <a:t>✓ More realistic for actual decisions</a:t>
-            </a:r>
-          </a:p>
-        </p:txBody>
-      </p:sp>
-    </p:spTree>
-  </p:cSld>
-  <p:clrMapOvr>
-    <a:masterClrMapping/>
-  </p:clrMapOvr>
-</p:sld>
-</file>
-
 <file path=ppt/slides/slide15.xml><?xml version="1.0" encoding="utf-8"?>
 <p:sld xmlns:a="http://schemas.openxmlformats.org/drawingml/2006/main" xmlns:r="http://schemas.openxmlformats.org/officeDocument/2006/relationships" xmlns:p="http://schemas.openxmlformats.org/presentationml/2006/main">
   <p:cSld>
@@ -4003,7 +3920,7 @@
               <a:defRPr sz="4400"/>
             </a:pPr>
             <a:r>
-              <a:t>When Do Decisions Differ?</a:t>
+              <a:t>Two Decision Approaches</a:t>
             </a:r>
           </a:p>
         </p:txBody>
@@ -4020,128 +3937,129 @@
         </p:nvSpPr>
         <p:spPr/>
         <p:txBody>
-          <a:bodyPr>
-            <a:noAutofit/>
-          </a:bodyPr>
-          <a:lstStyle/>
-          <a:p>
-            <a:r>
-              <a:rPr sz="2800" dirty="0"/>
-              <a:t>Example: Candidate with </a:t>
-            </a:r>
-            <a:r>
-              <a:rPr sz="2800" dirty="0" err="1"/>
-              <a:t>Pr</a:t>
-            </a:r>
-            <a:r>
-              <a:rPr sz="2800" dirty="0"/>
-              <a:t>(Good) = 0.55</a:t>
-            </a:r>
-          </a:p>
-          <a:p>
-            <a:pPr lvl="1">
-              <a:defRPr sz="1800">
+          <a:bodyPr/>
+          <a:lstStyle/>
+          <a:p>
+            <a:r>
+              <a:rPr b="1" dirty="0"/>
+              <a:t>Approach 1: Probability-Based</a:t>
+            </a:r>
+          </a:p>
+          <a:p>
+            <a:pPr marL="933450" indent="-336550">
+              <a:defRPr sz="2000" b="1">
                 <a:solidFill>
                   <a:srgbClr val="2ECC71"/>
                 </a:solidFill>
               </a:defRPr>
             </a:pPr>
             <a:r>
-              <a:rPr sz="2000" dirty="0"/>
-              <a:t>Probability-based: HIRE (55% &gt; 50%)</a:t>
-            </a:r>
-          </a:p>
-          <a:p>
-            <a:pPr lvl="1"/>
-            <a:endParaRPr sz="2000" dirty="0"/>
-          </a:p>
-          <a:p>
-            <a:pPr lvl="1">
-              <a:defRPr sz="1800"/>
-            </a:pPr>
-            <a:r>
-              <a:rPr sz="2000" dirty="0"/>
-              <a:t>Payoff-based (B=10, b=2):</a:t>
-            </a:r>
-          </a:p>
-          <a:p>
-            <a:pPr lvl="1">
-              <a:defRPr sz="1800" b="1"/>
-            </a:pPr>
-            <a:r>
-              <a:rPr sz="2000" dirty="0"/>
-              <a:t>E[Payoff] = 2 + 8 × 0.55 = 6.4 &gt; 0 → HIRE</a:t>
-            </a:r>
-          </a:p>
-          <a:p>
-            <a:pPr lvl="1"/>
-            <a:endParaRPr sz="2000" dirty="0"/>
-          </a:p>
-          <a:p>
-            <a:pPr lvl="1">
-              <a:defRPr sz="1800"/>
-            </a:pPr>
-            <a:r>
-              <a:rPr sz="2000" dirty="0"/>
-              <a:t>Payoff-based (B=10, b=-10):</a:t>
-            </a:r>
-          </a:p>
-          <a:p>
-            <a:pPr lvl="1">
-              <a:defRPr sz="1800" b="1"/>
-            </a:pPr>
-            <a:r>
-              <a:rPr sz="2000" dirty="0"/>
-              <a:t>E[Payoff] = -10 + 20 × 0.55 = 1 &gt; 0 → HIRE</a:t>
-            </a:r>
-          </a:p>
-          <a:p>
-            <a:pPr lvl="1"/>
-            <a:endParaRPr sz="2000" dirty="0"/>
-          </a:p>
-          <a:p>
-            <a:pPr lvl="1">
-              <a:defRPr sz="1800"/>
-            </a:pPr>
-            <a:r>
-              <a:rPr sz="2000" dirty="0"/>
-              <a:t>Payoff-based (B=10, b=-30):</a:t>
-            </a:r>
-          </a:p>
-          <a:p>
-            <a:pPr lvl="1">
-              <a:defRPr sz="1800" b="1">
+              <a:rPr dirty="0"/>
+              <a:t>IF </a:t>
+            </a:r>
+            <a:r>
+              <a:rPr dirty="0" err="1"/>
+              <a:t>Pr</a:t>
+            </a:r>
+            <a:r>
+              <a:rPr dirty="0"/>
+              <a:t>(F = good | G, N) &gt; 0.5 → HIRE</a:t>
+            </a:r>
+          </a:p>
+          <a:p>
+            <a:pPr marL="933450" indent="-336550">
+              <a:defRPr sz="2000" b="1">
                 <a:solidFill>
                   <a:srgbClr val="E74C3C"/>
                 </a:solidFill>
               </a:defRPr>
             </a:pPr>
             <a:r>
-              <a:rPr sz="2000" dirty="0"/>
-              <a:t>E[Payoff] = -30 + 40 × 0.55 = -8 &lt; 0 → REJECT</a:t>
-            </a:r>
+              <a:rPr dirty="0"/>
+              <a:t>ELSE → REJECT</a:t>
+            </a:r>
+          </a:p>
+          <a:p>
+            <a:pPr marL="933450" indent="-336550">
+              <a:defRPr sz="1800"/>
+            </a:pPr>
+            <a:r>
+              <a:rPr dirty="0"/>
+              <a:t>✓ Simple and intuitive</a:t>
+            </a:r>
+          </a:p>
+          <a:p>
+            <a:pPr marL="933450" indent="-336550">
+              <a:defRPr sz="1800"/>
+            </a:pPr>
+            <a:r>
+              <a:rPr dirty="0"/>
+              <a:t>✗ Assumes symmetric costs</a:t>
+            </a:r>
+            <a:endParaRPr lang="en-US" dirty="0"/>
+          </a:p>
+          <a:p>
+            <a:pPr marL="596900" indent="0">
+              <a:buNone/>
+              <a:defRPr sz="1800"/>
+            </a:pPr>
+            <a:endParaRPr dirty="0"/>
           </a:p>
           <a:p>
             <a:pPr>
-              <a:defRPr sz="1800" b="1">
+              <a:defRPr sz="2000" b="1">
                 <a:solidFill>
                   <a:srgbClr val="003366"/>
                 </a:solidFill>
               </a:defRPr>
             </a:pPr>
-            <a:endParaRPr lang="en-US" sz="2000" dirty="0"/>
-          </a:p>
-          <a:p>
-            <a:pPr>
-              <a:defRPr sz="1800" b="1">
+            <a:r>
+              <a:rPr sz="2800" dirty="0"/>
+              <a:t>Approach 2: Payoff-Based</a:t>
+            </a:r>
+          </a:p>
+          <a:p>
+            <a:pPr marL="987425" indent="-401638">
+              <a:defRPr sz="2000" b="1">
                 <a:solidFill>
-                  <a:srgbClr val="003366"/>
+                  <a:srgbClr val="2ECC71"/>
                 </a:solidFill>
               </a:defRPr>
             </a:pPr>
             <a:r>
-              <a:rPr sz="2000" dirty="0"/>
-              <a:t>Key insight: High cost of bad hires makes us more conservative!</a:t>
+              <a:rPr dirty="0"/>
+              <a:t>IF E[Payoff] &gt; 0 → HIRE</a:t>
+            </a:r>
+          </a:p>
+          <a:p>
+            <a:pPr marL="987425" indent="-401638">
+              <a:defRPr sz="2000" b="1">
+                <a:solidFill>
+                  <a:srgbClr val="E74C3C"/>
+                </a:solidFill>
+              </a:defRPr>
+            </a:pPr>
+            <a:r>
+              <a:rPr dirty="0"/>
+              <a:t>ELSE → REJECT</a:t>
+            </a:r>
+          </a:p>
+          <a:p>
+            <a:pPr marL="987425" indent="-401638">
+              <a:defRPr sz="1800"/>
+            </a:pPr>
+            <a:r>
+              <a:rPr dirty="0"/>
+              <a:t>✓ Accounts for different costs/benefits</a:t>
+            </a:r>
+          </a:p>
+          <a:p>
+            <a:pPr marL="987425" indent="-401638">
+              <a:defRPr sz="1800"/>
+            </a:pPr>
+            <a:r>
+              <a:rPr dirty="0"/>
+              <a:t>✓ More realistic for actual decisions</a:t>
             </a:r>
           </a:p>
         </p:txBody>
@@ -4190,7 +4108,7 @@
               <a:defRPr sz="4400"/>
             </a:pPr>
             <a:r>
-              <a:t>Summary</a:t>
+              <a:t>When Do Decisions Differ?</a:t>
             </a:r>
           </a:p>
         </p:txBody>
@@ -4207,134 +4125,129 @@
         </p:nvSpPr>
         <p:spPr/>
         <p:txBody>
-          <a:bodyPr/>
-          <a:lstStyle/>
-          <a:p>
-            <a:pPr marL="457200" indent="-457200">
-              <a:spcAft>
-                <a:spcPts val="1200"/>
-              </a:spcAft>
-              <a:buFont typeface="+mj-lt"/>
-              <a:buAutoNum type="arabicPeriod"/>
-              <a:defRPr sz="2200" b="1"/>
-            </a:pPr>
-            <a:r>
-              <a:rPr dirty="0"/>
-              <a:t>Start with prior belief about candidate quality</a:t>
-            </a:r>
-          </a:p>
-          <a:p>
-            <a:pPr marL="457200" indent="-457200">
-              <a:spcAft>
-                <a:spcPts val="1200"/>
-              </a:spcAft>
-              <a:buFont typeface="+mj-lt"/>
-              <a:buAutoNum type="arabicPeriod"/>
-              <a:defRPr sz="2200" b="1"/>
-            </a:pPr>
-            <a:r>
-              <a:rPr dirty="0"/>
-              <a:t>Observe signals: Network effect (G) and Papers (N)</a:t>
-            </a:r>
-          </a:p>
-          <a:p>
-            <a:pPr marL="457200" indent="-457200">
-              <a:spcAft>
-                <a:spcPts val="1200"/>
-              </a:spcAft>
-              <a:buFont typeface="+mj-lt"/>
-              <a:buAutoNum type="arabicPeriod"/>
-              <a:defRPr sz="2200" b="1"/>
-            </a:pPr>
-            <a:r>
-              <a:rPr dirty="0"/>
-              <a:t>Use Bayes' theorem to update beliefs</a:t>
-            </a:r>
-          </a:p>
-          <a:p>
-            <a:pPr marL="457200" indent="-457200">
-              <a:spcAft>
-                <a:spcPts val="1200"/>
-              </a:spcAft>
-              <a:buFont typeface="+mj-lt"/>
-              <a:buAutoNum type="arabicPeriod"/>
-              <a:defRPr sz="2200" b="1"/>
-            </a:pPr>
-            <a:r>
-              <a:rPr dirty="0"/>
-              <a:t>Get posterior probability: </a:t>
-            </a:r>
-            <a:r>
-              <a:rPr dirty="0" err="1"/>
+          <a:bodyPr>
+            <a:noAutofit/>
+          </a:bodyPr>
+          <a:lstStyle/>
+          <a:p>
+            <a:r>
+              <a:rPr sz="2800" dirty="0"/>
+              <a:t>Example: Candidate with </a:t>
+            </a:r>
+            <a:r>
+              <a:rPr sz="2800" dirty="0" err="1"/>
               <a:t>Pr</a:t>
             </a:r>
             <a:r>
-              <a:rPr dirty="0"/>
-              <a:t>(F = good | G, N)</a:t>
-            </a:r>
-          </a:p>
-          <a:p>
-            <a:pPr marL="457200" indent="-457200">
-              <a:spcAft>
-                <a:spcPts val="1200"/>
-              </a:spcAft>
-              <a:buFont typeface="+mj-lt"/>
-              <a:buAutoNum type="arabicPeriod"/>
-              <a:defRPr sz="2200" b="1"/>
-            </a:pPr>
-            <a:r>
-              <a:rPr lang="en-GB" dirty="0"/>
-              <a:t>Compute expected payoff: E[Payoff] = B × </a:t>
-            </a:r>
-            <a:r>
-              <a:rPr lang="en-GB" dirty="0" err="1"/>
-              <a:t>Pr</a:t>
-            </a:r>
-            <a:r>
-              <a:rPr lang="en-GB" dirty="0"/>
-              <a:t>(Good) + b × </a:t>
-            </a:r>
-            <a:r>
-              <a:rPr lang="en-GB" dirty="0" err="1"/>
-              <a:t>Pr</a:t>
-            </a:r>
-            <a:r>
-              <a:rPr lang="en-GB" dirty="0"/>
-              <a:t>(Bad)</a:t>
-            </a:r>
-          </a:p>
-          <a:p>
-            <a:pPr marL="457200" indent="-457200">
-              <a:spcAft>
-                <a:spcPts val="1200"/>
-              </a:spcAft>
-              <a:buFont typeface="+mj-lt"/>
-              <a:buAutoNum type="arabicPeriod"/>
-              <a:defRPr sz="2200" b="1"/>
-            </a:pPr>
-            <a:r>
-              <a:rPr dirty="0"/>
-              <a:t>Make hiring decision based on probability</a:t>
-            </a:r>
-            <a:r>
-              <a:rPr lang="en-US" dirty="0"/>
-              <a:t> </a:t>
-            </a:r>
-            <a:r>
-              <a:rPr lang="en-GB" dirty="0"/>
-              <a:t> (probability-based or payoff-based)</a:t>
-            </a:r>
-          </a:p>
-          <a:p>
-            <a:pPr marL="457200" indent="-457200">
-              <a:spcAft>
-                <a:spcPts val="1200"/>
-              </a:spcAft>
-              <a:buFont typeface="+mj-lt"/>
-              <a:buAutoNum type="arabicPeriod"/>
-              <a:defRPr sz="2200" b="1"/>
-            </a:pPr>
-            <a:endParaRPr dirty="0"/>
+              <a:rPr sz="2800" dirty="0"/>
+              <a:t>(Good) = 0.55</a:t>
+            </a:r>
+          </a:p>
+          <a:p>
+            <a:pPr lvl="1">
+              <a:defRPr sz="1800">
+                <a:solidFill>
+                  <a:srgbClr val="2ECC71"/>
+                </a:solidFill>
+              </a:defRPr>
+            </a:pPr>
+            <a:r>
+              <a:rPr sz="2000" dirty="0"/>
+              <a:t>Probability-based: HIRE (55% &gt; 50%)</a:t>
+            </a:r>
+          </a:p>
+          <a:p>
+            <a:pPr lvl="1"/>
+            <a:endParaRPr sz="2000" dirty="0"/>
+          </a:p>
+          <a:p>
+            <a:pPr lvl="1">
+              <a:defRPr sz="1800"/>
+            </a:pPr>
+            <a:r>
+              <a:rPr sz="2000" dirty="0"/>
+              <a:t>Payoff-based (B=10, b=2):</a:t>
+            </a:r>
+          </a:p>
+          <a:p>
+            <a:pPr lvl="1">
+              <a:defRPr sz="1800" b="1"/>
+            </a:pPr>
+            <a:r>
+              <a:rPr sz="2000" dirty="0"/>
+              <a:t>E[Payoff] = 2 + 8 × 0.55 = 6.4 &gt; 0 → HIRE</a:t>
+            </a:r>
+          </a:p>
+          <a:p>
+            <a:pPr lvl="1"/>
+            <a:endParaRPr sz="2000" dirty="0"/>
+          </a:p>
+          <a:p>
+            <a:pPr lvl="1">
+              <a:defRPr sz="1800"/>
+            </a:pPr>
+            <a:r>
+              <a:rPr sz="2000" dirty="0"/>
+              <a:t>Payoff-based (B=10, b=-10):</a:t>
+            </a:r>
+          </a:p>
+          <a:p>
+            <a:pPr lvl="1">
+              <a:defRPr sz="1800" b="1"/>
+            </a:pPr>
+            <a:r>
+              <a:rPr sz="2000" dirty="0"/>
+              <a:t>E[Payoff] = -10 + 20 × 0.55 = 1 &gt; 0 → HIRE</a:t>
+            </a:r>
+          </a:p>
+          <a:p>
+            <a:pPr lvl="1"/>
+            <a:endParaRPr sz="2000" dirty="0"/>
+          </a:p>
+          <a:p>
+            <a:pPr lvl="1">
+              <a:defRPr sz="1800"/>
+            </a:pPr>
+            <a:r>
+              <a:rPr sz="2000" dirty="0"/>
+              <a:t>Payoff-based (B=10, b=-30):</a:t>
+            </a:r>
+          </a:p>
+          <a:p>
+            <a:pPr lvl="1">
+              <a:defRPr sz="1800" b="1">
+                <a:solidFill>
+                  <a:srgbClr val="E74C3C"/>
+                </a:solidFill>
+              </a:defRPr>
+            </a:pPr>
+            <a:r>
+              <a:rPr sz="2000" dirty="0"/>
+              <a:t>E[Payoff] = -30 + 40 × 0.55 = -8 &lt; 0 → REJECT</a:t>
+            </a:r>
+          </a:p>
+          <a:p>
+            <a:pPr>
+              <a:defRPr sz="1800" b="1">
+                <a:solidFill>
+                  <a:srgbClr val="003366"/>
+                </a:solidFill>
+              </a:defRPr>
+            </a:pPr>
+            <a:endParaRPr lang="en-US" sz="2000" dirty="0"/>
+          </a:p>
+          <a:p>
+            <a:pPr>
+              <a:defRPr sz="1800" b="1">
+                <a:solidFill>
+                  <a:srgbClr val="003366"/>
+                </a:solidFill>
+              </a:defRPr>
+            </a:pPr>
+            <a:r>
+              <a:rPr sz="2000" dirty="0"/>
+              <a:t>Key insight: High cost of bad hires makes us more conservative!</a:t>
+            </a:r>
           </a:p>
         </p:txBody>
       </p:sp>
@@ -4347,6 +4260,198 @@
 </file>
 
 <file path=ppt/slides/slide17.xml><?xml version="1.0" encoding="utf-8"?>
+<p:sld xmlns:a="http://schemas.openxmlformats.org/drawingml/2006/main" xmlns:r="http://schemas.openxmlformats.org/officeDocument/2006/relationships" xmlns:p="http://schemas.openxmlformats.org/presentationml/2006/main">
+  <p:cSld>
+    <p:spTree>
+      <p:nvGrpSpPr>
+        <p:cNvPr id="1" name=""/>
+        <p:cNvGrpSpPr/>
+        <p:nvPr/>
+      </p:nvGrpSpPr>
+      <p:grpSpPr>
+        <a:xfrm>
+          <a:off x="0" y="0"/>
+          <a:ext cx="0" cy="0"/>
+          <a:chOff x="0" y="0"/>
+          <a:chExt cx="0" cy="0"/>
+        </a:xfrm>
+      </p:grpSpPr>
+      <p:sp>
+        <p:nvSpPr>
+          <p:cNvPr id="2" name="Title 1"/>
+          <p:cNvSpPr>
+            <a:spLocks noGrp="1"/>
+          </p:cNvSpPr>
+          <p:nvPr>
+            <p:ph type="title"/>
+          </p:nvPr>
+        </p:nvSpPr>
+        <p:spPr/>
+        <p:txBody>
+          <a:bodyPr/>
+          <a:lstStyle/>
+          <a:p>
+            <a:pPr>
+              <a:defRPr sz="4400"/>
+            </a:pPr>
+            <a:r>
+              <a:t>Summary</a:t>
+            </a:r>
+          </a:p>
+        </p:txBody>
+      </p:sp>
+      <p:sp>
+        <p:nvSpPr>
+          <p:cNvPr id="3" name="Content Placeholder 2"/>
+          <p:cNvSpPr>
+            <a:spLocks noGrp="1"/>
+          </p:cNvSpPr>
+          <p:nvPr>
+            <p:ph idx="1"/>
+          </p:nvPr>
+        </p:nvSpPr>
+        <p:spPr/>
+        <p:txBody>
+          <a:bodyPr/>
+          <a:lstStyle/>
+          <a:p>
+            <a:pPr marL="457200" indent="-457200">
+              <a:spcAft>
+                <a:spcPts val="1200"/>
+              </a:spcAft>
+              <a:buFont typeface="+mj-lt"/>
+              <a:buAutoNum type="arabicPeriod"/>
+              <a:defRPr sz="2200" b="1"/>
+            </a:pPr>
+            <a:r>
+              <a:rPr dirty="0"/>
+              <a:t>Start with prior belief about candidate quality</a:t>
+            </a:r>
+          </a:p>
+          <a:p>
+            <a:pPr marL="457200" indent="-457200">
+              <a:spcAft>
+                <a:spcPts val="1200"/>
+              </a:spcAft>
+              <a:buFont typeface="+mj-lt"/>
+              <a:buAutoNum type="arabicPeriod"/>
+              <a:defRPr sz="2200" b="1"/>
+            </a:pPr>
+            <a:r>
+              <a:rPr dirty="0"/>
+              <a:t>Observe signals: Network effect (G) and Papers (N)</a:t>
+            </a:r>
+          </a:p>
+          <a:p>
+            <a:pPr marL="457200" indent="-457200">
+              <a:spcAft>
+                <a:spcPts val="1200"/>
+              </a:spcAft>
+              <a:buFont typeface="+mj-lt"/>
+              <a:buAutoNum type="arabicPeriod"/>
+              <a:defRPr sz="2200" b="1"/>
+            </a:pPr>
+            <a:r>
+              <a:rPr dirty="0"/>
+              <a:t>Use Bayes' theorem to update beliefs</a:t>
+            </a:r>
+          </a:p>
+          <a:p>
+            <a:pPr marL="457200" indent="-457200">
+              <a:spcAft>
+                <a:spcPts val="1200"/>
+              </a:spcAft>
+              <a:buFont typeface="+mj-lt"/>
+              <a:buAutoNum type="arabicPeriod"/>
+              <a:defRPr sz="2200" b="1"/>
+            </a:pPr>
+            <a:r>
+              <a:rPr dirty="0"/>
+              <a:t>Get posterior probability: </a:t>
+            </a:r>
+            <a:r>
+              <a:rPr dirty="0" err="1"/>
+              <a:t>Pr</a:t>
+            </a:r>
+            <a:r>
+              <a:rPr dirty="0"/>
+              <a:t>(F = good | G, N)</a:t>
+            </a:r>
+          </a:p>
+          <a:p>
+            <a:pPr marL="457200" indent="-457200">
+              <a:spcAft>
+                <a:spcPts val="1200"/>
+              </a:spcAft>
+              <a:buFont typeface="+mj-lt"/>
+              <a:buAutoNum type="arabicPeriod"/>
+              <a:defRPr sz="2200" b="1"/>
+            </a:pPr>
+            <a:r>
+              <a:rPr lang="en-GB" dirty="0"/>
+              <a:t>Compute expected payoff: E[Payoff] = B × </a:t>
+            </a:r>
+            <a:r>
+              <a:rPr lang="en-GB" dirty="0" err="1"/>
+              <a:t>Pr</a:t>
+            </a:r>
+            <a:r>
+              <a:rPr lang="en-GB" dirty="0"/>
+              <a:t>(Good) + b × </a:t>
+            </a:r>
+            <a:r>
+              <a:rPr lang="en-GB" dirty="0" err="1"/>
+              <a:t>Pr</a:t>
+            </a:r>
+            <a:r>
+              <a:rPr lang="en-GB" dirty="0"/>
+              <a:t>(Bad)</a:t>
+            </a:r>
+          </a:p>
+          <a:p>
+            <a:pPr marL="457200" indent="-457200">
+              <a:spcAft>
+                <a:spcPts val="1200"/>
+              </a:spcAft>
+              <a:buFont typeface="+mj-lt"/>
+              <a:buAutoNum type="arabicPeriod"/>
+              <a:defRPr sz="2200" b="1"/>
+            </a:pPr>
+            <a:r>
+              <a:rPr dirty="0"/>
+              <a:t>Make hiring decision based on probability</a:t>
+            </a:r>
+            <a:r>
+              <a:rPr lang="en-US" dirty="0"/>
+              <a:t> </a:t>
+            </a:r>
+            <a:r>
+              <a:rPr lang="en-GB" dirty="0"/>
+              <a:t> (probability-based or payoff-based)</a:t>
+            </a:r>
+          </a:p>
+          <a:p>
+            <a:pPr marL="457200" indent="-457200">
+              <a:spcAft>
+                <a:spcPts val="1200"/>
+              </a:spcAft>
+              <a:buFont typeface="+mj-lt"/>
+              <a:buAutoNum type="arabicPeriod"/>
+              <a:defRPr sz="2200" b="1"/>
+            </a:pPr>
+            <a:endParaRPr dirty="0"/>
+          </a:p>
+        </p:txBody>
+      </p:sp>
+    </p:spTree>
+  </p:cSld>
+  <p:clrMapOvr>
+    <a:masterClrMapping/>
+  </p:clrMapOvr>
+</p:sld>
+</file>
+
+<file path=ppt/slides/slide18.xml><?xml version="1.0" encoding="utf-8"?>
 <p:sld xmlns:a="http://schemas.openxmlformats.org/drawingml/2006/main" xmlns:r="http://schemas.openxmlformats.org/officeDocument/2006/relationships" xmlns:p="http://schemas.openxmlformats.org/presentationml/2006/main">
   <p:cSld>
     <p:spTree>
@@ -5342,20 +5447,7 @@
             </a:r>
           </a:p>
           <a:p>
-            <a:pPr>
-              <a:defRPr sz="2000"/>
-            </a:pPr>
-            <a:r>
-              <a:rPr lang="en-GB" dirty="0">
-                <a:solidFill>
-                  <a:schemeClr val="tx2"/>
-                </a:solidFill>
-              </a:rPr>
-              <a:t>Updated Belief = Prior × Evidence</a:t>
-            </a:r>
-          </a:p>
-          <a:p>
-            <a:pPr marL="0" indent="0">
+            <a:pPr marL="0" indent="0" algn="ctr">
               <a:buNone/>
               <a:defRPr sz="2000"/>
             </a:pPr>
@@ -5366,7 +5458,33 @@
             </a:endParaRPr>
           </a:p>
           <a:p>
-            <a:pPr>
+            <a:pPr marL="0" indent="0" algn="ctr">
+              <a:buNone/>
+              <a:defRPr sz="2000"/>
+            </a:pPr>
+            <a:r>
+              <a:rPr lang="en-GB" sz="2800" dirty="0">
+                <a:solidFill>
+                  <a:schemeClr val="tx2"/>
+                </a:solidFill>
+              </a:rPr>
+              <a:t>Updated Belief = Prior × Likelihood / Evidence</a:t>
+            </a:r>
+          </a:p>
+          <a:p>
+            <a:pPr marL="0" indent="0">
+              <a:buNone/>
+              <a:defRPr sz="2000"/>
+            </a:pPr>
+            <a:endParaRPr lang="en-GB" dirty="0">
+              <a:solidFill>
+                <a:schemeClr val="tx2"/>
+              </a:solidFill>
+            </a:endParaRPr>
+          </a:p>
+          <a:p>
+            <a:pPr marL="0" indent="0" algn="ctr">
+              <a:buNone/>
               <a:defRPr sz="2000"/>
             </a:pPr>
             <a:r>
@@ -5379,33 +5497,42 @@
             </a:r>
             <a:r>
               <a:rPr lang="en-US" dirty="0"/>
-              <a:t>      </a:t>
-            </a:r>
-            <a:r>
-              <a:rPr dirty="0" err="1"/>
+              <a:t> </a:t>
+            </a:r>
+            <a:r>
+              <a:rPr lang="en-GB" dirty="0" err="1"/>
               <a:t>Pr</a:t>
             </a:r>
             <a:r>
+              <a:rPr lang="en-GB" dirty="0"/>
+              <a:t>(good)</a:t>
+            </a:r>
+            <a:r>
+              <a:rPr lang="en-US" dirty="0"/>
+              <a:t> </a:t>
+            </a:r>
+            <a:r>
               <a:rPr dirty="0"/>
-              <a:t>(G, N | good) × </a:t>
-            </a:r>
-            <a:r>
-              <a:rPr dirty="0" err="1"/>
+              <a:t>× </a:t>
+            </a:r>
+            <a:r>
+              <a:rPr lang="en-GB" dirty="0" err="1"/>
               <a:t>Pr</a:t>
             </a:r>
             <a:r>
-              <a:rPr dirty="0"/>
-              <a:t>(good)</a:t>
-            </a:r>
-          </a:p>
-          <a:p>
-            <a:pPr marL="457200" lvl="1" indent="0">
+              <a:rPr lang="en-GB" dirty="0"/>
+              <a:t>(G, N | good)</a:t>
+            </a:r>
+            <a:endParaRPr dirty="0"/>
+          </a:p>
+          <a:p>
+            <a:pPr marL="457200" lvl="1" indent="0" algn="ctr">
               <a:buNone/>
               <a:defRPr sz="1800"/>
             </a:pPr>
             <a:r>
               <a:rPr lang="en-US" dirty="0"/>
-              <a:t>                                            </a:t>
+              <a:t>                                    </a:t>
             </a:r>
             <a:r>
               <a:rPr dirty="0"/>
@@ -5418,17 +5545,13 @@
             <a:endParaRPr lang="en-US" dirty="0"/>
           </a:p>
           <a:p>
-            <a:pPr marL="457200" lvl="1" indent="0">
+            <a:pPr marL="457200" lvl="1" indent="0" algn="ctr">
               <a:buNone/>
               <a:defRPr sz="1800"/>
             </a:pPr>
             <a:r>
               <a:rPr lang="en-AT" dirty="0"/>
-              <a:t>                                                              </a:t>
-            </a:r>
-            <a:r>
-              <a:rPr dirty="0"/>
-              <a:t> </a:t>
+              <a:t>                        </a:t>
             </a:r>
             <a:r>
               <a:rPr dirty="0" err="1"/>
@@ -5512,11 +5635,19 @@
           <a:p>
             <a:r>
               <a:rPr dirty="0"/>
-              <a:t>For each combination of signals, we compute the probability:</a:t>
-            </a:r>
-          </a:p>
-          <a:p>
-            <a:pPr>
+              <a:t>For each combination of signals, we compute the probability</a:t>
+            </a:r>
+            <a:r>
+              <a:rPr lang="en-US" dirty="0"/>
+              <a:t> of being a “good” candidate</a:t>
+            </a:r>
+            <a:r>
+              <a:rPr dirty="0"/>
+              <a:t>:</a:t>
+            </a:r>
+          </a:p>
+          <a:p>
+            <a:pPr marL="987425" indent="-336550">
               <a:defRPr sz="1800"/>
             </a:pPr>
             <a:r>
@@ -5533,7 +5664,7 @@
             </a:r>
           </a:p>
           <a:p>
-            <a:pPr>
+            <a:pPr marL="987425" indent="-336550">
               <a:defRPr sz="1800"/>
             </a:pPr>
             <a:r>
@@ -5542,7 +5673,7 @@
             </a:r>
           </a:p>
           <a:p>
-            <a:pPr>
+            <a:pPr marL="987425" indent="-336550">
               <a:defRPr sz="1800" b="1"/>
             </a:pPr>
             <a:r>
@@ -5584,6 +5715,53 @@
           </a:prstGeom>
         </p:spPr>
       </p:pic>
+      <p:sp>
+        <p:nvSpPr>
+          <p:cNvPr id="5" name="Down Arrow 4">
+            <a:extLst>
+              <a:ext uri="{FF2B5EF4-FFF2-40B4-BE49-F238E27FC236}">
+                <a16:creationId xmlns:a16="http://schemas.microsoft.com/office/drawing/2014/main" id="{DB914FA4-9C08-454E-B13B-DAD7FB8D1050}"/>
+              </a:ext>
+            </a:extLst>
+          </p:cNvPr>
+          <p:cNvSpPr/>
+          <p:nvPr/>
+        </p:nvSpPr>
+        <p:spPr>
+          <a:xfrm rot="13468933">
+            <a:off x="3243942" y="5970987"/>
+            <a:ext cx="448153" cy="904762"/>
+          </a:xfrm>
+          <a:prstGeom prst="downArrow">
+            <a:avLst/>
+          </a:prstGeom>
+          <a:solidFill>
+            <a:schemeClr val="tx1"/>
+          </a:solidFill>
+        </p:spPr>
+        <p:style>
+          <a:lnRef idx="1">
+            <a:schemeClr val="accent1"/>
+          </a:lnRef>
+          <a:fillRef idx="3">
+            <a:schemeClr val="accent1"/>
+          </a:fillRef>
+          <a:effectRef idx="2">
+            <a:schemeClr val="accent1"/>
+          </a:effectRef>
+          <a:fontRef idx="minor">
+            <a:schemeClr val="lt1"/>
+          </a:fontRef>
+        </p:style>
+        <p:txBody>
+          <a:bodyPr rtlCol="0" anchor="ctr"/>
+          <a:lstStyle/>
+          <a:p>
+            <a:pPr algn="ctr"/>
+            <a:endParaRPr lang="en-AT"/>
+          </a:p>
+        </p:txBody>
+      </p:sp>
     </p:spTree>
   </p:cSld>
   <p:clrMapOvr>
@@ -5597,7 +5775,13 @@
   <p:cSld>
     <p:spTree>
       <p:nvGrpSpPr>
-        <p:cNvPr id="1" name=""/>
+        <p:cNvPr id="1" name="">
+          <a:extLst>
+            <a:ext uri="{FF2B5EF4-FFF2-40B4-BE49-F238E27FC236}">
+              <a16:creationId xmlns:a16="http://schemas.microsoft.com/office/drawing/2014/main" id="{58F7617A-B377-15A9-1049-536536E2273B}"/>
+            </a:ext>
+          </a:extLst>
+        </p:cNvPr>
         <p:cNvGrpSpPr/>
         <p:nvPr/>
       </p:nvGrpSpPr>
@@ -5611,7 +5795,13 @@
       </p:grpSpPr>
       <p:sp>
         <p:nvSpPr>
-          <p:cNvPr id="2" name="Title 1"/>
+          <p:cNvPr id="2" name="Title 1">
+            <a:extLst>
+              <a:ext uri="{FF2B5EF4-FFF2-40B4-BE49-F238E27FC236}">
+                <a16:creationId xmlns:a16="http://schemas.microsoft.com/office/drawing/2014/main" id="{BB727CDB-D601-F376-C873-8E9CCC0CC344}"/>
+              </a:ext>
+            </a:extLst>
+          </p:cNvPr>
           <p:cNvSpPr>
             <a:spLocks noGrp="1"/>
           </p:cNvSpPr>
@@ -5628,33 +5818,22 @@
               <a:defRPr sz="4400"/>
             </a:pPr>
             <a:r>
-              <a:t>Real Examples: Four Candidates</a:t>
-            </a:r>
-          </a:p>
-        </p:txBody>
-      </p:sp>
-      <p:sp>
-        <p:nvSpPr>
-          <p:cNvPr id="3" name="Content Placeholder 2"/>
-          <p:cNvSpPr>
-            <a:spLocks noGrp="1"/>
-          </p:cNvSpPr>
-          <p:nvPr>
-            <p:ph idx="1"/>
-          </p:nvPr>
-        </p:nvSpPr>
-        <p:spPr/>
-        <p:txBody>
-          <a:bodyPr/>
-          <a:lstStyle/>
-          <a:p>
-            <a:endParaRPr/>
+              <a:rPr lang="en-US" dirty="0"/>
+              <a:t>Interpretation</a:t>
+            </a:r>
+            <a:endParaRPr dirty="0"/>
           </a:p>
         </p:txBody>
       </p:sp>
       <p:pic>
         <p:nvPicPr>
-          <p:cNvPr id="4" name="Picture 3" descr="temp_examples.png"/>
+          <p:cNvPr id="4" name="Picture 3" descr="temp_heatmap.png">
+            <a:extLst>
+              <a:ext uri="{FF2B5EF4-FFF2-40B4-BE49-F238E27FC236}">
+                <a16:creationId xmlns:a16="http://schemas.microsoft.com/office/drawing/2014/main" id="{311B11CF-6B56-9C32-D1EF-9245E31A737D}"/>
+              </a:ext>
+            </a:extLst>
+          </p:cNvPr>
           <p:cNvPicPr>
             <a:picLocks noChangeAspect="1"/>
           </p:cNvPicPr>
@@ -5668,15 +5847,102 @@
         </p:blipFill>
         <p:spPr>
           <a:xfrm>
-            <a:off x="457200" y="1371600"/>
-            <a:ext cx="8229600" cy="5029200"/>
+            <a:off x="457200" y="1417638"/>
+            <a:ext cx="8229600" cy="3200400"/>
           </a:xfrm>
           <a:prstGeom prst="rect">
             <a:avLst/>
           </a:prstGeom>
         </p:spPr>
       </p:pic>
+      <p:sp>
+        <p:nvSpPr>
+          <p:cNvPr id="5" name="Down Arrow 4">
+            <a:extLst>
+              <a:ext uri="{FF2B5EF4-FFF2-40B4-BE49-F238E27FC236}">
+                <a16:creationId xmlns:a16="http://schemas.microsoft.com/office/drawing/2014/main" id="{C18CB631-EFB0-5864-5E42-6BB42DFD1E11}"/>
+              </a:ext>
+            </a:extLst>
+          </p:cNvPr>
+          <p:cNvSpPr/>
+          <p:nvPr/>
+        </p:nvSpPr>
+        <p:spPr>
+          <a:xfrm rot="10800000">
+            <a:off x="3701142" y="4414330"/>
+            <a:ext cx="448153" cy="904762"/>
+          </a:xfrm>
+          <a:prstGeom prst="downArrow">
+            <a:avLst/>
+          </a:prstGeom>
+          <a:solidFill>
+            <a:schemeClr val="tx1"/>
+          </a:solidFill>
+        </p:spPr>
+        <p:style>
+          <a:lnRef idx="1">
+            <a:schemeClr val="accent1"/>
+          </a:lnRef>
+          <a:fillRef idx="3">
+            <a:schemeClr val="accent1"/>
+          </a:fillRef>
+          <a:effectRef idx="2">
+            <a:schemeClr val="accent1"/>
+          </a:effectRef>
+          <a:fontRef idx="minor">
+            <a:schemeClr val="lt1"/>
+          </a:fontRef>
+        </p:style>
+        <p:txBody>
+          <a:bodyPr rtlCol="0" anchor="ctr"/>
+          <a:lstStyle/>
+          <a:p>
+            <a:pPr algn="ctr"/>
+            <a:endParaRPr lang="en-AT"/>
+          </a:p>
+        </p:txBody>
+      </p:sp>
+      <p:sp>
+        <p:nvSpPr>
+          <p:cNvPr id="8" name="TextBox 7">
+            <a:extLst>
+              <a:ext uri="{FF2B5EF4-FFF2-40B4-BE49-F238E27FC236}">
+                <a16:creationId xmlns:a16="http://schemas.microsoft.com/office/drawing/2014/main" id="{D1D2DBB3-37A2-D445-B280-9D402F140E17}"/>
+              </a:ext>
+            </a:extLst>
+          </p:cNvPr>
+          <p:cNvSpPr txBox="1"/>
+          <p:nvPr/>
+        </p:nvSpPr>
+        <p:spPr>
+          <a:xfrm>
+            <a:off x="1059049" y="5468650"/>
+            <a:ext cx="5732338" cy="584775"/>
+          </a:xfrm>
+          <a:prstGeom prst="rect">
+            <a:avLst/>
+          </a:prstGeom>
+          <a:noFill/>
+        </p:spPr>
+        <p:txBody>
+          <a:bodyPr wrap="none" rtlCol="0">
+            <a:spAutoFit/>
+          </a:bodyPr>
+          <a:lstStyle/>
+          <a:p>
+            <a:r>
+              <a:rPr lang="en-AT" sz="3200" dirty="0"/>
+              <a:t>5 papers are worth 3 chaperoned</a:t>
+            </a:r>
+          </a:p>
+        </p:txBody>
+      </p:sp>
     </p:spTree>
+    <p:extLst>
+      <p:ext uri="{BB962C8B-B14F-4D97-AF65-F5344CB8AC3E}">
+        <p14:creationId xmlns:p14="http://schemas.microsoft.com/office/powerpoint/2010/main" val="906735650"/>
+      </p:ext>
+    </p:extLst>
   </p:cSld>
   <p:clrMapOvr>
     <a:masterClrMapping/>

</xml_diff>